<commit_message>
Changes to discovery, figures
</commit_message>
<xml_diff>
--- a/tex/figures/architecture.pptx
+++ b/tex/figures/architecture.pptx
@@ -8,13 +8,15 @@
     <p:sldMasterId id="2147483720" r:id="rId4"/>
   </p:sldMasterIdLst>
   <p:notesMasterIdLst>
-    <p:notesMasterId r:id="rId9"/>
+    <p:notesMasterId r:id="rId11"/>
   </p:notesMasterIdLst>
   <p:sldIdLst>
     <p:sldId id="256" r:id="rId5"/>
     <p:sldId id="257" r:id="rId6"/>
     <p:sldId id="258" r:id="rId7"/>
-    <p:sldId id="259" r:id="rId8"/>
+    <p:sldId id="261" r:id="rId8"/>
+    <p:sldId id="259" r:id="rId9"/>
+    <p:sldId id="260" r:id="rId10"/>
   </p:sldIdLst>
   <p:sldSz cx="9144000" cy="6858000" type="screen4x3"/>
   <p:notesSz cx="6858000" cy="9144000"/>
@@ -532,6 +534,90 @@
             <a:fld id="{8C136986-AA16-8C47-9C0A-BEB54C93F616}" type="slidenum">
               <a:rPr lang="en-US" smtClean="0"/>
               <a:t>4</a:t>
+            </a:fld>
+            <a:endParaRPr lang="en-US"/>
+          </a:p>
+        </p:txBody>
+      </p:sp>
+    </p:spTree>
+    <p:extLst>
+      <p:ext uri="{BB962C8B-B14F-4D97-AF65-F5344CB8AC3E}">
+        <p14:creationId xmlns:p14="http://schemas.microsoft.com/office/powerpoint/2010/main" val="928215216"/>
+      </p:ext>
+    </p:extLst>
+  </p:cSld>
+  <p:clrMapOvr>
+    <a:masterClrMapping/>
+  </p:clrMapOvr>
+</p:notes>
+</file>
+
+<file path=ppt/notesSlides/notesSlide2.xml><?xml version="1.0" encoding="utf-8"?>
+<p:notes xmlns:a="http://schemas.openxmlformats.org/drawingml/2006/main" xmlns:r="http://schemas.openxmlformats.org/officeDocument/2006/relationships" xmlns:p="http://schemas.openxmlformats.org/presentationml/2006/main">
+  <p:cSld>
+    <p:spTree>
+      <p:nvGrpSpPr>
+        <p:cNvPr id="1" name=""/>
+        <p:cNvGrpSpPr/>
+        <p:nvPr/>
+      </p:nvGrpSpPr>
+      <p:grpSpPr>
+        <a:xfrm>
+          <a:off x="0" y="0"/>
+          <a:ext cx="0" cy="0"/>
+          <a:chOff x="0" y="0"/>
+          <a:chExt cx="0" cy="0"/>
+        </a:xfrm>
+      </p:grpSpPr>
+      <p:sp>
+        <p:nvSpPr>
+          <p:cNvPr id="2" name="Slide Image Placeholder 1"/>
+          <p:cNvSpPr>
+            <a:spLocks noGrp="1" noRot="1" noChangeAspect="1"/>
+          </p:cNvSpPr>
+          <p:nvPr>
+            <p:ph type="sldImg"/>
+          </p:nvPr>
+        </p:nvSpPr>
+        <p:spPr/>
+      </p:sp>
+      <p:sp>
+        <p:nvSpPr>
+          <p:cNvPr id="3" name="Notes Placeholder 2"/>
+          <p:cNvSpPr>
+            <a:spLocks noGrp="1"/>
+          </p:cNvSpPr>
+          <p:nvPr>
+            <p:ph type="body" idx="1"/>
+          </p:nvPr>
+        </p:nvSpPr>
+        <p:spPr/>
+        <p:txBody>
+          <a:bodyPr/>
+          <a:lstStyle/>
+          <a:p>
+            <a:endParaRPr lang="en-US" dirty="0"/>
+          </a:p>
+        </p:txBody>
+      </p:sp>
+      <p:sp>
+        <p:nvSpPr>
+          <p:cNvPr id="4" name="Slide Number Placeholder 3"/>
+          <p:cNvSpPr>
+            <a:spLocks noGrp="1"/>
+          </p:cNvSpPr>
+          <p:nvPr>
+            <p:ph type="sldNum" sz="quarter" idx="10"/>
+          </p:nvPr>
+        </p:nvSpPr>
+        <p:spPr/>
+        <p:txBody>
+          <a:bodyPr/>
+          <a:lstStyle/>
+          <a:p>
+            <a:fld id="{8C136986-AA16-8C47-9C0A-BEB54C93F616}" type="slidenum">
+              <a:rPr lang="en-US" smtClean="0"/>
+              <a:t>5</a:t>
             </a:fld>
             <a:endParaRPr lang="en-US"/>
           </a:p>
@@ -14355,310 +14441,1943 @@
       </p:grpSpPr>
       <p:sp>
         <p:nvSpPr>
-          <p:cNvPr id="4" name="Rectangle 3"/>
+          <p:cNvPr id="6" name="Rounded Rectangle 5"/>
           <p:cNvSpPr/>
           <p:nvPr/>
         </p:nvSpPr>
         <p:spPr>
           <a:xfrm>
-            <a:off x="841375" y="1193711"/>
-            <a:ext cx="7651749" cy="4031872"/>
+            <a:off x="619125" y="428625"/>
+            <a:ext cx="1857375" cy="4048125"/>
+          </a:xfrm>
+          <a:prstGeom prst="roundRect">
+            <a:avLst/>
+          </a:prstGeom>
+        </p:spPr>
+        <p:style>
+          <a:lnRef idx="2">
+            <a:schemeClr val="accent6"/>
+          </a:lnRef>
+          <a:fillRef idx="1">
+            <a:schemeClr val="lt1"/>
+          </a:fillRef>
+          <a:effectRef idx="0">
+            <a:schemeClr val="accent6"/>
+          </a:effectRef>
+          <a:fontRef idx="minor">
+            <a:schemeClr val="dk1"/>
+          </a:fontRef>
+        </p:style>
+        <p:txBody>
+          <a:bodyPr rtlCol="0" anchor="ctr"/>
+          <a:lstStyle/>
+          <a:p>
+            <a:pPr algn="ctr"/>
+            <a:endParaRPr lang="en-US"/>
+          </a:p>
+        </p:txBody>
+      </p:sp>
+      <p:sp>
+        <p:nvSpPr>
+          <p:cNvPr id="19" name="Rounded Rectangle 18"/>
+          <p:cNvSpPr/>
+          <p:nvPr/>
+        </p:nvSpPr>
+        <p:spPr>
+          <a:xfrm>
+            <a:off x="2714625" y="3203562"/>
+            <a:ext cx="4302125" cy="1143000"/>
+          </a:xfrm>
+          <a:prstGeom prst="roundRect">
+            <a:avLst/>
+          </a:prstGeom>
+        </p:spPr>
+        <p:style>
+          <a:lnRef idx="1">
+            <a:schemeClr val="accent2"/>
+          </a:lnRef>
+          <a:fillRef idx="3">
+            <a:schemeClr val="accent2"/>
+          </a:fillRef>
+          <a:effectRef idx="2">
+            <a:schemeClr val="accent2"/>
+          </a:effectRef>
+          <a:fontRef idx="minor">
+            <a:schemeClr val="lt1"/>
+          </a:fontRef>
+        </p:style>
+        <p:txBody>
+          <a:bodyPr rtlCol="0" anchor="ctr"/>
+          <a:lstStyle/>
+          <a:p>
+            <a:pPr algn="ctr"/>
+            <a:endParaRPr lang="en-US"/>
+          </a:p>
+        </p:txBody>
+      </p:sp>
+      <p:sp>
+        <p:nvSpPr>
+          <p:cNvPr id="2" name="Rounded Rectangle 1"/>
+          <p:cNvSpPr/>
+          <p:nvPr/>
+        </p:nvSpPr>
+        <p:spPr>
+          <a:xfrm>
+            <a:off x="508000" y="333375"/>
+            <a:ext cx="6588125" cy="1270000"/>
+          </a:xfrm>
+          <a:prstGeom prst="roundRect">
+            <a:avLst/>
+          </a:prstGeom>
+          <a:solidFill>
+            <a:schemeClr val="lt1">
+              <a:alpha val="47000"/>
+            </a:schemeClr>
+          </a:solidFill>
+        </p:spPr>
+        <p:style>
+          <a:lnRef idx="2">
+            <a:schemeClr val="accent2"/>
+          </a:lnRef>
+          <a:fillRef idx="1">
+            <a:schemeClr val="lt1"/>
+          </a:fillRef>
+          <a:effectRef idx="0">
+            <a:schemeClr val="accent2"/>
+          </a:effectRef>
+          <a:fontRef idx="minor">
+            <a:schemeClr val="dk1"/>
+          </a:fontRef>
+        </p:style>
+        <p:txBody>
+          <a:bodyPr rtlCol="0" anchor="ctr"/>
+          <a:lstStyle/>
+          <a:p>
+            <a:pPr algn="ctr"/>
+            <a:endParaRPr lang="en-US"/>
+          </a:p>
+        </p:txBody>
+      </p:sp>
+      <p:grpSp>
+        <p:nvGrpSpPr>
+          <p:cNvPr id="43" name="Group 42"/>
+          <p:cNvGrpSpPr/>
+          <p:nvPr/>
+        </p:nvGrpSpPr>
+        <p:grpSpPr>
+          <a:xfrm>
+            <a:off x="844547" y="571493"/>
+            <a:ext cx="5877668" cy="3614745"/>
+            <a:chOff x="844547" y="571493"/>
+            <a:chExt cx="5877668" cy="3614745"/>
+          </a:xfrm>
+        </p:grpSpPr>
+        <p:sp>
+          <p:nvSpPr>
+            <p:cNvPr id="5" name="Rounded Rectangle 4"/>
+            <p:cNvSpPr/>
+            <p:nvPr/>
+          </p:nvSpPr>
+          <p:spPr>
+            <a:xfrm>
+              <a:off x="844547" y="571493"/>
+              <a:ext cx="1460500" cy="809625"/>
+            </a:xfrm>
+            <a:prstGeom prst="roundRect">
+              <a:avLst/>
+            </a:prstGeom>
+          </p:spPr>
+          <p:style>
+            <a:lnRef idx="1">
+              <a:schemeClr val="accent4"/>
+            </a:lnRef>
+            <a:fillRef idx="2">
+              <a:schemeClr val="accent4"/>
+            </a:fillRef>
+            <a:effectRef idx="1">
+              <a:schemeClr val="accent4"/>
+            </a:effectRef>
+            <a:fontRef idx="minor">
+              <a:schemeClr val="dk1"/>
+            </a:fontRef>
+          </p:style>
+          <p:txBody>
+            <a:bodyPr rtlCol="0" anchor="ctr"/>
+            <a:lstStyle/>
+            <a:p>
+              <a:pPr algn="ctr"/>
+              <a:r>
+                <a:rPr lang="en-US" b="1" dirty="0"/>
+                <a:t>Role Query Generator</a:t>
+              </a:r>
+              <a:endParaRPr lang="en-US" b="1" dirty="0"/>
+            </a:p>
+          </p:txBody>
+        </p:sp>
+        <p:sp>
+          <p:nvSpPr>
+            <p:cNvPr id="7" name="Rounded Rectangle 6"/>
+            <p:cNvSpPr/>
+            <p:nvPr/>
+          </p:nvSpPr>
+          <p:spPr>
+            <a:xfrm>
+              <a:off x="3051173" y="571493"/>
+              <a:ext cx="1460500" cy="809625"/>
+            </a:xfrm>
+            <a:prstGeom prst="roundRect">
+              <a:avLst/>
+            </a:prstGeom>
+          </p:spPr>
+          <p:style>
+            <a:lnRef idx="1">
+              <a:schemeClr val="accent4"/>
+            </a:lnRef>
+            <a:fillRef idx="2">
+              <a:schemeClr val="accent4"/>
+            </a:fillRef>
+            <a:effectRef idx="1">
+              <a:schemeClr val="accent4"/>
+            </a:effectRef>
+            <a:fontRef idx="minor">
+              <a:schemeClr val="dk1"/>
+            </a:fontRef>
+          </p:style>
+          <p:txBody>
+            <a:bodyPr rtlCol="0" anchor="ctr"/>
+            <a:lstStyle/>
+            <a:p>
+              <a:pPr algn="ctr"/>
+              <a:r>
+                <a:rPr lang="en-US" b="1" dirty="0"/>
+                <a:t>Web Search</a:t>
+              </a:r>
+              <a:endParaRPr lang="en-US" b="1" dirty="0"/>
+            </a:p>
+          </p:txBody>
+        </p:sp>
+        <p:sp>
+          <p:nvSpPr>
+            <p:cNvPr id="8" name="Rounded Rectangle 7"/>
+            <p:cNvSpPr/>
+            <p:nvPr/>
+          </p:nvSpPr>
+          <p:spPr>
+            <a:xfrm>
+              <a:off x="5261715" y="3376613"/>
+              <a:ext cx="1460500" cy="809625"/>
+            </a:xfrm>
+            <a:prstGeom prst="roundRect">
+              <a:avLst/>
+            </a:prstGeom>
+          </p:spPr>
+          <p:style>
+            <a:lnRef idx="1">
+              <a:schemeClr val="accent4"/>
+            </a:lnRef>
+            <a:fillRef idx="2">
+              <a:schemeClr val="accent4"/>
+            </a:fillRef>
+            <a:effectRef idx="1">
+              <a:schemeClr val="accent4"/>
+            </a:effectRef>
+            <a:fontRef idx="minor">
+              <a:schemeClr val="dk1"/>
+            </a:fontRef>
+          </p:style>
+          <p:txBody>
+            <a:bodyPr rtlCol="0" anchor="ctr"/>
+            <a:lstStyle/>
+            <a:p>
+              <a:pPr algn="ctr"/>
+              <a:r>
+                <a:rPr lang="en-US" b="1" dirty="0" smtClean="0"/>
+                <a:t>Local Role</a:t>
+              </a:r>
+            </a:p>
+            <a:p>
+              <a:pPr algn="ctr"/>
+              <a:r>
+                <a:rPr lang="en-US" b="1" dirty="0" smtClean="0"/>
+                <a:t>Extractor</a:t>
+              </a:r>
+              <a:endParaRPr lang="en-US" b="1" dirty="0"/>
+            </a:p>
+          </p:txBody>
+        </p:sp>
+        <p:sp>
+          <p:nvSpPr>
+            <p:cNvPr id="10" name="Rounded Rectangle 9"/>
+            <p:cNvSpPr/>
+            <p:nvPr/>
+          </p:nvSpPr>
+          <p:spPr>
+            <a:xfrm>
+              <a:off x="5261715" y="571493"/>
+              <a:ext cx="1460500" cy="809625"/>
+            </a:xfrm>
+            <a:prstGeom prst="roundRect">
+              <a:avLst/>
+            </a:prstGeom>
+          </p:spPr>
+          <p:style>
+            <a:lnRef idx="1">
+              <a:schemeClr val="accent4"/>
+            </a:lnRef>
+            <a:fillRef idx="2">
+              <a:schemeClr val="accent4"/>
+            </a:fillRef>
+            <a:effectRef idx="1">
+              <a:schemeClr val="accent4"/>
+            </a:effectRef>
+            <a:fontRef idx="minor">
+              <a:schemeClr val="dk1"/>
+            </a:fontRef>
+          </p:style>
+          <p:txBody>
+            <a:bodyPr rtlCol="0" anchor="ctr"/>
+            <a:lstStyle/>
+            <a:p>
+              <a:pPr algn="ctr"/>
+              <a:r>
+                <a:rPr lang="en-US" b="1" dirty="0"/>
+                <a:t>Sentence Classifier</a:t>
+              </a:r>
+              <a:endParaRPr lang="en-US" b="1" dirty="0"/>
+            </a:p>
+          </p:txBody>
+        </p:sp>
+        <p:sp>
+          <p:nvSpPr>
+            <p:cNvPr id="12" name="Rounded Rectangle 11"/>
+            <p:cNvSpPr/>
+            <p:nvPr/>
+          </p:nvSpPr>
+          <p:spPr>
+            <a:xfrm>
+              <a:off x="3051173" y="3376613"/>
+              <a:ext cx="1460500" cy="809625"/>
+            </a:xfrm>
+            <a:prstGeom prst="roundRect">
+              <a:avLst/>
+            </a:prstGeom>
+          </p:spPr>
+          <p:style>
+            <a:lnRef idx="1">
+              <a:schemeClr val="accent4"/>
+            </a:lnRef>
+            <a:fillRef idx="2">
+              <a:schemeClr val="accent4"/>
+            </a:fillRef>
+            <a:effectRef idx="1">
+              <a:schemeClr val="accent4"/>
+            </a:effectRef>
+            <a:fontRef idx="minor">
+              <a:schemeClr val="dk1"/>
+            </a:fontRef>
+          </p:style>
+          <p:txBody>
+            <a:bodyPr rtlCol="0" anchor="ctr"/>
+            <a:lstStyle/>
+            <a:p>
+              <a:pPr algn="ctr"/>
+              <a:r>
+                <a:rPr lang="en-US" b="1" dirty="0" smtClean="0"/>
+                <a:t>Joint Role</a:t>
+              </a:r>
+            </a:p>
+            <a:p>
+              <a:pPr algn="ctr"/>
+              <a:r>
+                <a:rPr lang="en-US" b="1" dirty="0"/>
+                <a:t>Inference</a:t>
+              </a:r>
+              <a:endParaRPr lang="en-US" b="1" dirty="0"/>
+            </a:p>
+          </p:txBody>
+        </p:sp>
+        <p:sp>
+          <p:nvSpPr>
+            <p:cNvPr id="13" name="Rounded Rectangle 12"/>
+            <p:cNvSpPr/>
+            <p:nvPr/>
+          </p:nvSpPr>
+          <p:spPr>
+            <a:xfrm>
+              <a:off x="844547" y="3376613"/>
+              <a:ext cx="1460500" cy="809625"/>
+            </a:xfrm>
+            <a:prstGeom prst="roundRect">
+              <a:avLst/>
+            </a:prstGeom>
+          </p:spPr>
+          <p:style>
+            <a:lnRef idx="1">
+              <a:schemeClr val="accent4"/>
+            </a:lnRef>
+            <a:fillRef idx="2">
+              <a:schemeClr val="accent4"/>
+            </a:fillRef>
+            <a:effectRef idx="1">
+              <a:schemeClr val="accent4"/>
+            </a:effectRef>
+            <a:fontRef idx="minor">
+              <a:schemeClr val="dk1"/>
+            </a:fontRef>
+          </p:style>
+          <p:txBody>
+            <a:bodyPr rtlCol="0" anchor="ctr"/>
+            <a:lstStyle/>
+            <a:p>
+              <a:pPr algn="ctr"/>
+              <a:r>
+                <a:rPr lang="en-US" b="1" dirty="0"/>
+                <a:t>Role</a:t>
+              </a:r>
+            </a:p>
+            <a:p>
+              <a:pPr algn="ctr"/>
+              <a:r>
+                <a:rPr lang="en-US" b="1" dirty="0"/>
+                <a:t>Assessor</a:t>
+              </a:r>
+              <a:endParaRPr lang="en-US" b="1" dirty="0"/>
+            </a:p>
+          </p:txBody>
+        </p:sp>
+        <p:sp>
+          <p:nvSpPr>
+            <p:cNvPr id="25" name="Can 24"/>
+            <p:cNvSpPr/>
+            <p:nvPr/>
+          </p:nvSpPr>
+          <p:spPr>
+            <a:xfrm>
+              <a:off x="3051173" y="1995488"/>
+              <a:ext cx="1460502" cy="806795"/>
+            </a:xfrm>
+            <a:prstGeom prst="can">
+              <a:avLst/>
+            </a:prstGeom>
+          </p:spPr>
+          <p:style>
+            <a:lnRef idx="3">
+              <a:schemeClr val="lt1"/>
+            </a:lnRef>
+            <a:fillRef idx="1">
+              <a:schemeClr val="accent5"/>
+            </a:fillRef>
+            <a:effectRef idx="1">
+              <a:schemeClr val="accent5"/>
+            </a:effectRef>
+            <a:fontRef idx="minor">
+              <a:schemeClr val="lt1"/>
+            </a:fontRef>
+          </p:style>
+          <p:txBody>
+            <a:bodyPr rtlCol="0" anchor="ctr"/>
+            <a:lstStyle/>
+            <a:p>
+              <a:pPr algn="ctr"/>
+              <a:r>
+                <a:rPr lang="en-US" b="1" dirty="0" smtClean="0"/>
+                <a:t>Process KB</a:t>
+              </a:r>
+              <a:endParaRPr lang="en-US" b="1" dirty="0"/>
+            </a:p>
+          </p:txBody>
+        </p:sp>
+        <p:cxnSp>
+          <p:nvCxnSpPr>
+            <p:cNvPr id="4" name="Straight Arrow Connector 3"/>
+            <p:cNvCxnSpPr>
+              <a:stCxn id="5" idx="3"/>
+              <a:endCxn id="7" idx="1"/>
+            </p:cNvCxnSpPr>
+            <p:nvPr/>
+          </p:nvCxnSpPr>
+          <p:spPr>
+            <a:xfrm>
+              <a:off x="2305047" y="976306"/>
+              <a:ext cx="746126" cy="0"/>
+            </a:xfrm>
+            <a:prstGeom prst="straightConnector1">
+              <a:avLst/>
+            </a:prstGeom>
+            <a:ln w="28575" cmpd="sng">
+              <a:tailEnd type="arrow"/>
+            </a:ln>
+          </p:spPr>
+          <p:style>
+            <a:lnRef idx="3">
+              <a:schemeClr val="dk1"/>
+            </a:lnRef>
+            <a:fillRef idx="0">
+              <a:schemeClr val="dk1"/>
+            </a:fillRef>
+            <a:effectRef idx="2">
+              <a:schemeClr val="dk1"/>
+            </a:effectRef>
+            <a:fontRef idx="minor">
+              <a:schemeClr val="tx1"/>
+            </a:fontRef>
+          </p:style>
+        </p:cxnSp>
+        <p:cxnSp>
+          <p:nvCxnSpPr>
+            <p:cNvPr id="28" name="Straight Arrow Connector 27"/>
+            <p:cNvCxnSpPr/>
+            <p:nvPr/>
+          </p:nvCxnSpPr>
+          <p:spPr>
+            <a:xfrm>
+              <a:off x="4515589" y="976306"/>
+              <a:ext cx="746126" cy="0"/>
+            </a:xfrm>
+            <a:prstGeom prst="straightConnector1">
+              <a:avLst/>
+            </a:prstGeom>
+            <a:ln w="28575" cmpd="sng">
+              <a:tailEnd type="arrow"/>
+            </a:ln>
+          </p:spPr>
+          <p:style>
+            <a:lnRef idx="3">
+              <a:schemeClr val="dk1"/>
+            </a:lnRef>
+            <a:fillRef idx="0">
+              <a:schemeClr val="dk1"/>
+            </a:fillRef>
+            <a:effectRef idx="2">
+              <a:schemeClr val="dk1"/>
+            </a:effectRef>
+            <a:fontRef idx="minor">
+              <a:schemeClr val="tx1"/>
+            </a:fontRef>
+          </p:style>
+        </p:cxnSp>
+        <p:cxnSp>
+          <p:nvCxnSpPr>
+            <p:cNvPr id="11" name="Straight Arrow Connector 10"/>
+            <p:cNvCxnSpPr/>
+            <p:nvPr/>
+          </p:nvCxnSpPr>
+          <p:spPr>
+            <a:xfrm flipH="1" flipV="1">
+              <a:off x="2273297" y="1365243"/>
+              <a:ext cx="746126" cy="730257"/>
+            </a:xfrm>
+            <a:prstGeom prst="straightConnector1">
+              <a:avLst/>
+            </a:prstGeom>
+            <a:ln w="28575" cmpd="sng">
+              <a:tailEnd type="arrow"/>
+            </a:ln>
+          </p:spPr>
+          <p:style>
+            <a:lnRef idx="3">
+              <a:schemeClr val="dk1"/>
+            </a:lnRef>
+            <a:fillRef idx="0">
+              <a:schemeClr val="dk1"/>
+            </a:fillRef>
+            <a:effectRef idx="2">
+              <a:schemeClr val="dk1"/>
+            </a:effectRef>
+            <a:fontRef idx="minor">
+              <a:schemeClr val="tx1"/>
+            </a:fontRef>
+          </p:style>
+        </p:cxnSp>
+        <p:cxnSp>
+          <p:nvCxnSpPr>
+            <p:cNvPr id="34" name="Straight Arrow Connector 33"/>
+            <p:cNvCxnSpPr/>
+            <p:nvPr/>
+          </p:nvCxnSpPr>
+          <p:spPr>
+            <a:xfrm flipV="1">
+              <a:off x="2273297" y="2646356"/>
+              <a:ext cx="746126" cy="730257"/>
+            </a:xfrm>
+            <a:prstGeom prst="straightConnector1">
+              <a:avLst/>
+            </a:prstGeom>
+            <a:ln w="28575" cmpd="sng">
+              <a:tailEnd type="arrow"/>
+            </a:ln>
+          </p:spPr>
+          <p:style>
+            <a:lnRef idx="3">
+              <a:schemeClr val="dk1"/>
+            </a:lnRef>
+            <a:fillRef idx="0">
+              <a:schemeClr val="dk1"/>
+            </a:fillRef>
+            <a:effectRef idx="2">
+              <a:schemeClr val="dk1"/>
+            </a:effectRef>
+            <a:fontRef idx="minor">
+              <a:schemeClr val="tx1"/>
+            </a:fontRef>
+          </p:style>
+        </p:cxnSp>
+        <p:cxnSp>
+          <p:nvCxnSpPr>
+            <p:cNvPr id="22" name="Straight Arrow Connector 21"/>
+            <p:cNvCxnSpPr>
+              <a:stCxn id="13" idx="0"/>
+              <a:endCxn id="5" idx="2"/>
+            </p:cNvCxnSpPr>
+            <p:nvPr/>
+          </p:nvCxnSpPr>
+          <p:spPr>
+            <a:xfrm flipV="1">
+              <a:off x="1574797" y="1381118"/>
+              <a:ext cx="0" cy="1995495"/>
+            </a:xfrm>
+            <a:prstGeom prst="straightConnector1">
+              <a:avLst/>
+            </a:prstGeom>
+            <a:ln w="28575" cmpd="sng">
+              <a:tailEnd type="arrow"/>
+            </a:ln>
+          </p:spPr>
+          <p:style>
+            <a:lnRef idx="3">
+              <a:schemeClr val="dk1"/>
+            </a:lnRef>
+            <a:fillRef idx="0">
+              <a:schemeClr val="dk1"/>
+            </a:fillRef>
+            <a:effectRef idx="2">
+              <a:schemeClr val="dk1"/>
+            </a:effectRef>
+            <a:fontRef idx="minor">
+              <a:schemeClr val="tx1"/>
+            </a:fontRef>
+          </p:style>
+        </p:cxnSp>
+        <p:cxnSp>
+          <p:nvCxnSpPr>
+            <p:cNvPr id="37" name="Straight Arrow Connector 36"/>
+            <p:cNvCxnSpPr/>
+            <p:nvPr/>
+          </p:nvCxnSpPr>
+          <p:spPr>
+            <a:xfrm>
+              <a:off x="5991965" y="1381118"/>
+              <a:ext cx="0" cy="1995495"/>
+            </a:xfrm>
+            <a:prstGeom prst="straightConnector1">
+              <a:avLst/>
+            </a:prstGeom>
+            <a:ln w="28575" cmpd="sng">
+              <a:tailEnd type="arrow"/>
+            </a:ln>
+          </p:spPr>
+          <p:style>
+            <a:lnRef idx="3">
+              <a:schemeClr val="dk1"/>
+            </a:lnRef>
+            <a:fillRef idx="0">
+              <a:schemeClr val="dk1"/>
+            </a:fillRef>
+            <a:effectRef idx="2">
+              <a:schemeClr val="dk1"/>
+            </a:effectRef>
+            <a:fontRef idx="minor">
+              <a:schemeClr val="tx1"/>
+            </a:fontRef>
+          </p:style>
+        </p:cxnSp>
+        <p:cxnSp>
+          <p:nvCxnSpPr>
+            <p:cNvPr id="39" name="Straight Arrow Connector 38"/>
+            <p:cNvCxnSpPr/>
+            <p:nvPr/>
+          </p:nvCxnSpPr>
+          <p:spPr>
+            <a:xfrm flipH="1">
+              <a:off x="2305047" y="3827456"/>
+              <a:ext cx="746126" cy="0"/>
+            </a:xfrm>
+            <a:prstGeom prst="straightConnector1">
+              <a:avLst/>
+            </a:prstGeom>
+            <a:ln w="28575" cmpd="sng">
+              <a:tailEnd type="arrow"/>
+            </a:ln>
+          </p:spPr>
+          <p:style>
+            <a:lnRef idx="3">
+              <a:schemeClr val="dk1"/>
+            </a:lnRef>
+            <a:fillRef idx="0">
+              <a:schemeClr val="dk1"/>
+            </a:fillRef>
+            <a:effectRef idx="2">
+              <a:schemeClr val="dk1"/>
+            </a:effectRef>
+            <a:fontRef idx="minor">
+              <a:schemeClr val="tx1"/>
+            </a:fontRef>
+          </p:style>
+        </p:cxnSp>
+        <p:cxnSp>
+          <p:nvCxnSpPr>
+            <p:cNvPr id="40" name="Straight Arrow Connector 39"/>
+            <p:cNvCxnSpPr/>
+            <p:nvPr/>
+          </p:nvCxnSpPr>
+          <p:spPr>
+            <a:xfrm flipH="1">
+              <a:off x="4515589" y="3822687"/>
+              <a:ext cx="746126" cy="0"/>
+            </a:xfrm>
+            <a:prstGeom prst="straightConnector1">
+              <a:avLst/>
+            </a:prstGeom>
+            <a:ln w="28575" cmpd="sng">
+              <a:tailEnd type="arrow"/>
+            </a:ln>
+          </p:spPr>
+          <p:style>
+            <a:lnRef idx="3">
+              <a:schemeClr val="dk1"/>
+            </a:lnRef>
+            <a:fillRef idx="0">
+              <a:schemeClr val="dk1"/>
+            </a:fillRef>
+            <a:effectRef idx="2">
+              <a:schemeClr val="dk1"/>
+            </a:effectRef>
+            <a:fontRef idx="minor">
+              <a:schemeClr val="tx1"/>
+            </a:fontRef>
+          </p:style>
+        </p:cxnSp>
+      </p:grpSp>
+      <p:sp>
+        <p:nvSpPr>
+          <p:cNvPr id="3" name="TextBox 2"/>
+          <p:cNvSpPr txBox="1"/>
+          <p:nvPr/>
+        </p:nvSpPr>
+        <p:spPr>
+          <a:xfrm>
+            <a:off x="7318375" y="653140"/>
+            <a:ext cx="1397000" cy="646331"/>
           </a:xfrm>
           <a:prstGeom prst="rect">
             <a:avLst/>
           </a:prstGeom>
-          <a:ln w="38100" cmpd="sng">
-            <a:solidFill>
-              <a:srgbClr val="7F7F7F"/>
-            </a:solidFill>
-            <a:prstDash val="sysDash"/>
-          </a:ln>
+          <a:noFill/>
         </p:spPr>
         <p:txBody>
-          <a:bodyPr wrap="square">
+          <a:bodyPr wrap="square" rtlCol="0">
             <a:spAutoFit/>
           </a:bodyPr>
           <a:lstStyle/>
           <a:p>
-            <a:pPr algn="just"/>
-            <a:endParaRPr lang="en-US" sz="3200" b="1" baseline="30000" dirty="0" smtClean="0">
-              <a:latin typeface="Times"/>
-              <a:cs typeface="Times"/>
-            </a:endParaRPr>
-          </a:p>
-          <a:p>
-            <a:pPr algn="just"/>
-            <a:r>
-              <a:rPr lang="en-US" sz="3200" b="1" baseline="30000" dirty="0" smtClean="0">
-                <a:latin typeface="Times"/>
+            <a:r>
+              <a:rPr lang="en-US" dirty="0" smtClean="0"/>
+              <a:t>Sentence Gathering</a:t>
+            </a:r>
+            <a:endParaRPr lang="en-US" dirty="0"/>
+          </a:p>
+        </p:txBody>
+      </p:sp>
+      <p:sp>
+        <p:nvSpPr>
+          <p:cNvPr id="21" name="TextBox 20"/>
+          <p:cNvSpPr txBox="1"/>
+          <p:nvPr/>
+        </p:nvSpPr>
+        <p:spPr>
+          <a:xfrm>
+            <a:off x="7318375" y="3504290"/>
+            <a:ext cx="1397000" cy="646331"/>
+          </a:xfrm>
+          <a:prstGeom prst="rect">
+            <a:avLst/>
+          </a:prstGeom>
+          <a:noFill/>
+        </p:spPr>
+        <p:txBody>
+          <a:bodyPr wrap="square" rtlCol="0">
+            <a:spAutoFit/>
+          </a:bodyPr>
+          <a:lstStyle/>
+          <a:p>
+            <a:r>
+              <a:rPr lang="en-US" dirty="0" smtClean="0"/>
+              <a:t>Extraction &amp; Inference</a:t>
+            </a:r>
+            <a:endParaRPr lang="en-US" dirty="0"/>
+          </a:p>
+        </p:txBody>
+      </p:sp>
+    </p:spTree>
+    <p:extLst>
+      <p:ext uri="{BB962C8B-B14F-4D97-AF65-F5344CB8AC3E}">
+        <p14:creationId xmlns:p14="http://schemas.microsoft.com/office/powerpoint/2010/main" val="1252930348"/>
+      </p:ext>
+    </p:extLst>
+  </p:cSld>
+  <p:clrMapOvr>
+    <a:masterClrMapping/>
+  </p:clrMapOvr>
+</p:sld>
+</file>
+
+<file path=ppt/slides/slide5.xml><?xml version="1.0" encoding="utf-8"?>
+<p:sld xmlns:a="http://schemas.openxmlformats.org/drawingml/2006/main" xmlns:r="http://schemas.openxmlformats.org/officeDocument/2006/relationships" xmlns:p="http://schemas.openxmlformats.org/presentationml/2006/main">
+  <p:cSld>
+    <p:spTree>
+      <p:nvGrpSpPr>
+        <p:cNvPr id="1" name=""/>
+        <p:cNvGrpSpPr/>
+        <p:nvPr/>
+      </p:nvGrpSpPr>
+      <p:grpSpPr>
+        <a:xfrm>
+          <a:off x="0" y="0"/>
+          <a:ext cx="0" cy="0"/>
+          <a:chOff x="0" y="0"/>
+          <a:chExt cx="0" cy="0"/>
+        </a:xfrm>
+      </p:grpSpPr>
+      <p:grpSp>
+        <p:nvGrpSpPr>
+          <p:cNvPr id="7" name="Group 6"/>
+          <p:cNvGrpSpPr/>
+          <p:nvPr/>
+        </p:nvGrpSpPr>
+        <p:grpSpPr>
+          <a:xfrm>
+            <a:off x="-514228" y="1193712"/>
+            <a:ext cx="10937875" cy="2536913"/>
+            <a:chOff x="317499" y="1193711"/>
+            <a:chExt cx="8175625" cy="4031872"/>
+          </a:xfrm>
+        </p:grpSpPr>
+        <p:sp>
+          <p:nvSpPr>
+            <p:cNvPr id="6" name="Rounded Rectangle 5"/>
+            <p:cNvSpPr/>
+            <p:nvPr/>
+          </p:nvSpPr>
+          <p:spPr>
+            <a:xfrm>
+              <a:off x="317499" y="1381126"/>
+              <a:ext cx="8175625" cy="3844457"/>
+            </a:xfrm>
+            <a:prstGeom prst="roundRect">
+              <a:avLst/>
+            </a:prstGeom>
+            <a:noFill/>
+            <a:ln w="101600" cmpd="dbl"/>
+          </p:spPr>
+          <p:style>
+            <a:lnRef idx="1">
+              <a:schemeClr val="accent4"/>
+            </a:lnRef>
+            <a:fillRef idx="2">
+              <a:schemeClr val="accent4"/>
+            </a:fillRef>
+            <a:effectRef idx="1">
+              <a:schemeClr val="accent4"/>
+            </a:effectRef>
+            <a:fontRef idx="minor">
+              <a:schemeClr val="dk1"/>
+            </a:fontRef>
+          </p:style>
+          <p:txBody>
+            <a:bodyPr rtlCol="0" anchor="ctr"/>
+            <a:lstStyle/>
+            <a:p>
+              <a:pPr algn="ctr"/>
+              <a:endParaRPr lang="en-US"/>
+            </a:p>
+          </p:txBody>
+        </p:sp>
+        <p:sp>
+          <p:nvSpPr>
+            <p:cNvPr id="4" name="Rectangle 3"/>
+            <p:cNvSpPr/>
+            <p:nvPr/>
+          </p:nvSpPr>
+          <p:spPr>
+            <a:xfrm>
+              <a:off x="841375" y="1193711"/>
+              <a:ext cx="7651749" cy="2843769"/>
+            </a:xfrm>
+            <a:prstGeom prst="rect">
+              <a:avLst/>
+            </a:prstGeom>
+            <a:noFill/>
+            <a:ln w="76200" cmpd="tri">
+              <a:noFill/>
+            </a:ln>
+          </p:spPr>
+          <p:style>
+            <a:lnRef idx="1">
+              <a:schemeClr val="accent4"/>
+            </a:lnRef>
+            <a:fillRef idx="2">
+              <a:schemeClr val="accent4"/>
+            </a:fillRef>
+            <a:effectRef idx="1">
+              <a:schemeClr val="accent4"/>
+            </a:effectRef>
+            <a:fontRef idx="minor">
+              <a:schemeClr val="dk1"/>
+            </a:fontRef>
+          </p:style>
+          <p:txBody>
+            <a:bodyPr wrap="square">
+              <a:spAutoFit/>
+            </a:bodyPr>
+            <a:lstStyle/>
+            <a:p>
+              <a:pPr algn="just"/>
+              <a:endParaRPr lang="en-US" sz="3200" b="1" baseline="30000" dirty="0" smtClean="0">
                 <a:cs typeface="Times"/>
-              </a:rPr>
-              <a:t>1. When </a:t>
-            </a:r>
-            <a:r>
-              <a:rPr lang="en-US" sz="3200" b="1" baseline="30000" dirty="0">
-                <a:latin typeface="Times"/>
+              </a:endParaRPr>
+            </a:p>
+            <a:p>
+              <a:pPr algn="just"/>
+              <a:r>
+                <a:rPr lang="en-US" sz="3200" b="1" baseline="30000" dirty="0" smtClean="0">
+                  <a:cs typeface="Times"/>
+                </a:rPr>
+                <a:t>1. When </a:t>
+              </a:r>
+              <a:r>
+                <a:rPr lang="en-US" sz="3200" b="1" baseline="30000" dirty="0">
+                  <a:cs typeface="Times"/>
+                </a:rPr>
+                <a:t>plants use stored sugar for energy</a:t>
+              </a:r>
+              <a:r>
+                <a:rPr lang="en-US" sz="3200" b="1" baseline="30000" dirty="0" smtClean="0">
+                  <a:cs typeface="Times"/>
+                </a:rPr>
+                <a:t>,</a:t>
+              </a:r>
+              <a:r>
+                <a:rPr lang="en-US" sz="3200" b="1" dirty="0" smtClean="0">
+                  <a:cs typeface="Times"/>
+                </a:rPr>
+                <a:t> </a:t>
+              </a:r>
+              <a:r>
+                <a:rPr lang="en-US" sz="3200" b="1" baseline="30000" dirty="0" smtClean="0">
+                  <a:cs typeface="Times"/>
+                </a:rPr>
+                <a:t>they </a:t>
+              </a:r>
+              <a:r>
+                <a:rPr lang="en-US" sz="3200" b="1" baseline="30000" dirty="0">
+                  <a:cs typeface="Times"/>
+                </a:rPr>
+                <a:t>go through a </a:t>
+              </a:r>
+              <a:r>
+                <a:rPr lang="en-US" sz="3200" b="1" baseline="30000" dirty="0">
+                  <a:cs typeface="Times"/>
+                </a:rPr>
+                <a:t> </a:t>
+              </a:r>
+              <a:r>
+                <a:rPr lang="en-US" sz="3200" b="1" baseline="30000" dirty="0" smtClean="0">
+                  <a:cs typeface="Times"/>
+                </a:rPr>
+                <a:t>process </a:t>
+              </a:r>
+              <a:r>
+                <a:rPr lang="en-US" sz="3200" b="1" baseline="30000" dirty="0">
+                  <a:cs typeface="Times"/>
+                </a:rPr>
+                <a:t>called </a:t>
+              </a:r>
+              <a:endParaRPr lang="en-US" sz="3200" baseline="30000" dirty="0" smtClean="0">
                 <a:cs typeface="Times"/>
-              </a:rPr>
-              <a:t>plants use stored sugar for energy</a:t>
-            </a:r>
-            <a:r>
-              <a:rPr lang="en-US" sz="3200" b="1" baseline="30000" dirty="0" smtClean="0">
-                <a:latin typeface="Times"/>
+              </a:endParaRPr>
+            </a:p>
+            <a:p>
+              <a:pPr algn="just"/>
+              <a:r>
+                <a:rPr lang="en-US" sz="3200" baseline="30000" dirty="0" smtClean="0">
+                  <a:cs typeface="Times"/>
+                </a:rPr>
+                <a:t>(A) photosynthesis </a:t>
+              </a:r>
+              <a:r>
+                <a:rPr lang="en-US" sz="3200" baseline="30000" dirty="0">
+                  <a:cs typeface="Times"/>
+                </a:rPr>
+                <a:t>(</a:t>
+              </a:r>
+              <a:r>
+                <a:rPr lang="en-US" sz="3200" baseline="30000" dirty="0">
+                  <a:cs typeface="Times"/>
+                </a:rPr>
+                <a:t>B) transpiration </a:t>
+              </a:r>
+              <a:r>
+                <a:rPr lang="en-US" sz="3200" baseline="30000" dirty="0" smtClean="0">
+                  <a:cs typeface="Times"/>
+                </a:rPr>
+                <a:t>(</a:t>
+              </a:r>
+              <a:r>
+                <a:rPr lang="en-US" sz="3200" baseline="30000" dirty="0">
+                  <a:cs typeface="Times"/>
+                </a:rPr>
+                <a:t>C) respiration (D</a:t>
+              </a:r>
+              <a:r>
+                <a:rPr lang="en-US" sz="3200" baseline="30000" dirty="0">
+                  <a:cs typeface="Times"/>
+                </a:rPr>
+                <a:t>) perspiration.</a:t>
+              </a:r>
+            </a:p>
+            <a:p>
+              <a:pPr algn="just"/>
+              <a:endParaRPr lang="en-US" sz="3200" b="1" baseline="30000" dirty="0" smtClean="0">
                 <a:cs typeface="Times"/>
-              </a:rPr>
-              <a:t>,</a:t>
-            </a:r>
-            <a:r>
-              <a:rPr lang="en-US" sz="3200" b="1" dirty="0" smtClean="0">
-                <a:latin typeface="Times"/>
+              </a:endParaRPr>
+            </a:p>
+            <a:p>
+              <a:pPr algn="just"/>
+              <a:r>
+                <a:rPr lang="en-US" sz="3200" b="1" baseline="30000" dirty="0" smtClean="0">
+                  <a:cs typeface="Times"/>
+                </a:rPr>
+                <a:t>2. A </a:t>
+              </a:r>
+              <a:r>
+                <a:rPr lang="en-US" sz="3200" b="1" baseline="30000" dirty="0">
+                  <a:cs typeface="Times"/>
+                </a:rPr>
+                <a:t>pot is heated on a stove. </a:t>
+              </a:r>
+              <a:r>
+                <a:rPr lang="en-US" sz="3200" b="1" baseline="30000" dirty="0" smtClean="0">
+                  <a:cs typeface="Times"/>
+                </a:rPr>
+                <a:t>What </a:t>
+              </a:r>
+              <a:r>
+                <a:rPr lang="en-US" sz="3200" b="1" baseline="30000" dirty="0">
+                  <a:cs typeface="Times"/>
+                </a:rPr>
+                <a:t>causes the metal handle </a:t>
+              </a:r>
+              <a:r>
+                <a:rPr lang="en-US" sz="3200" b="1" baseline="30000" dirty="0" smtClean="0">
+                  <a:cs typeface="Times"/>
+                </a:rPr>
+                <a:t>of</a:t>
+              </a:r>
+              <a:r>
+                <a:rPr lang="en-US" sz="3200" b="1" dirty="0" smtClean="0">
+                  <a:cs typeface="Times"/>
+                </a:rPr>
+                <a:t> </a:t>
+              </a:r>
+              <a:r>
+                <a:rPr lang="en-US" sz="3200" b="1" baseline="30000" dirty="0" smtClean="0">
+                  <a:cs typeface="Times"/>
+                </a:rPr>
+                <a:t>the </a:t>
+              </a:r>
+              <a:r>
+                <a:rPr lang="en-US" sz="3200" b="1" baseline="30000" dirty="0">
+                  <a:cs typeface="Times"/>
+                </a:rPr>
+                <a:t>pot to become hot</a:t>
+              </a:r>
+              <a:r>
+                <a:rPr lang="en-US" sz="3200" b="1" baseline="30000" dirty="0" smtClean="0">
+                  <a:cs typeface="Times"/>
+                </a:rPr>
+                <a:t>?</a:t>
+              </a:r>
+              <a:endParaRPr lang="en-US" sz="3200" baseline="30000" dirty="0" smtClean="0">
                 <a:cs typeface="Times"/>
-              </a:rPr>
-              <a:t> </a:t>
-            </a:r>
-            <a:r>
-              <a:rPr lang="en-US" sz="3200" b="1" baseline="30000" dirty="0" smtClean="0">
-                <a:latin typeface="Times"/>
-                <a:cs typeface="Times"/>
-              </a:rPr>
-              <a:t>they </a:t>
-            </a:r>
-            <a:r>
-              <a:rPr lang="en-US" sz="3200" b="1" baseline="30000" dirty="0">
-                <a:latin typeface="Times"/>
-                <a:cs typeface="Times"/>
-              </a:rPr>
-              <a:t>go through a </a:t>
-            </a:r>
-            <a:r>
-              <a:rPr lang="en-US" sz="3200" b="1" baseline="30000" dirty="0">
-                <a:latin typeface="Times"/>
-                <a:cs typeface="Times"/>
-              </a:rPr>
-              <a:t> </a:t>
-            </a:r>
-            <a:r>
-              <a:rPr lang="en-US" sz="3200" b="1" baseline="30000" dirty="0" smtClean="0">
-                <a:latin typeface="Times"/>
-                <a:cs typeface="Times"/>
-              </a:rPr>
-              <a:t>process </a:t>
-            </a:r>
-            <a:r>
-              <a:rPr lang="en-US" sz="3200" b="1" baseline="30000" dirty="0">
-                <a:latin typeface="Times"/>
-                <a:cs typeface="Times"/>
-              </a:rPr>
-              <a:t>called </a:t>
-            </a:r>
-            <a:endParaRPr lang="en-US" sz="3200" b="1" baseline="30000" dirty="0">
-              <a:latin typeface="Times"/>
-              <a:cs typeface="Times"/>
-            </a:endParaRPr>
-          </a:p>
-          <a:p>
-            <a:pPr algn="just"/>
-            <a:endParaRPr lang="en-US" sz="3200" baseline="30000" dirty="0" smtClean="0">
-              <a:latin typeface="Times"/>
-              <a:cs typeface="Times"/>
-            </a:endParaRPr>
-          </a:p>
-          <a:p>
-            <a:pPr algn="just"/>
-            <a:r>
-              <a:rPr lang="en-US" sz="3200" baseline="30000" dirty="0" smtClean="0">
-                <a:latin typeface="Times"/>
-                <a:cs typeface="Times"/>
-              </a:rPr>
-              <a:t>(A) photosynthesis </a:t>
-            </a:r>
-            <a:r>
-              <a:rPr lang="en-US" sz="3200" baseline="30000" dirty="0">
-                <a:latin typeface="Times"/>
-                <a:cs typeface="Times"/>
-              </a:rPr>
-              <a:t>(</a:t>
-            </a:r>
-            <a:r>
-              <a:rPr lang="en-US" sz="3200" baseline="30000" dirty="0">
-                <a:latin typeface="Times"/>
-                <a:cs typeface="Times"/>
-              </a:rPr>
-              <a:t>B) transpiration </a:t>
-            </a:r>
-            <a:r>
-              <a:rPr lang="en-US" sz="3200" baseline="30000" dirty="0" smtClean="0">
-                <a:latin typeface="Times"/>
-                <a:cs typeface="Times"/>
-              </a:rPr>
-              <a:t>(</a:t>
-            </a:r>
-            <a:r>
-              <a:rPr lang="en-US" sz="3200" baseline="30000" dirty="0">
-                <a:latin typeface="Times"/>
-                <a:cs typeface="Times"/>
-              </a:rPr>
-              <a:t>C) respiration (D</a:t>
-            </a:r>
-            <a:r>
-              <a:rPr lang="en-US" sz="3200" baseline="30000" dirty="0">
-                <a:latin typeface="Times"/>
-                <a:cs typeface="Times"/>
-              </a:rPr>
-              <a:t>) perspiration.</a:t>
-            </a:r>
-          </a:p>
-          <a:p>
-            <a:pPr marL="342900" indent="-342900" algn="just">
-              <a:buAutoNum type="arabicPeriod"/>
-            </a:pPr>
-            <a:endParaRPr lang="en-US" sz="3200" baseline="30000" dirty="0">
-              <a:latin typeface="Times"/>
-              <a:cs typeface="Times"/>
-            </a:endParaRPr>
-          </a:p>
-          <a:p>
-            <a:pPr algn="just"/>
-            <a:endParaRPr lang="en-US" sz="3200" baseline="30000" dirty="0" smtClean="0">
-              <a:latin typeface="Times"/>
-              <a:cs typeface="Times"/>
-            </a:endParaRPr>
-          </a:p>
-          <a:p>
-            <a:pPr algn="just"/>
-            <a:r>
-              <a:rPr lang="en-US" sz="3200" b="1" baseline="30000" dirty="0" smtClean="0">
-                <a:latin typeface="Times"/>
-                <a:cs typeface="Times"/>
-              </a:rPr>
-              <a:t>2. A </a:t>
-            </a:r>
-            <a:r>
-              <a:rPr lang="en-US" sz="3200" b="1" baseline="30000" dirty="0">
-                <a:latin typeface="Times"/>
-                <a:cs typeface="Times"/>
-              </a:rPr>
-              <a:t>pot is heated on a stove. </a:t>
-            </a:r>
-            <a:r>
-              <a:rPr lang="en-US" sz="3200" b="1" baseline="30000" dirty="0" smtClean="0">
-                <a:latin typeface="Times"/>
-                <a:cs typeface="Times"/>
-              </a:rPr>
-              <a:t> What </a:t>
-            </a:r>
-            <a:r>
-              <a:rPr lang="en-US" sz="3200" b="1" baseline="30000" dirty="0">
-                <a:latin typeface="Times"/>
-                <a:cs typeface="Times"/>
-              </a:rPr>
-              <a:t>causes the metal handle </a:t>
-            </a:r>
-            <a:r>
-              <a:rPr lang="en-US" sz="3200" b="1" baseline="30000" dirty="0" smtClean="0">
-                <a:latin typeface="Times"/>
-                <a:cs typeface="Times"/>
-              </a:rPr>
-              <a:t>of</a:t>
-            </a:r>
-            <a:r>
-              <a:rPr lang="en-US" sz="3200" b="1" dirty="0" smtClean="0">
-                <a:latin typeface="Times"/>
-                <a:cs typeface="Times"/>
-              </a:rPr>
-              <a:t> </a:t>
-            </a:r>
-            <a:r>
-              <a:rPr lang="en-US" sz="3200" b="1" baseline="30000" dirty="0" smtClean="0">
-                <a:latin typeface="Times"/>
-                <a:cs typeface="Times"/>
-              </a:rPr>
-              <a:t>the </a:t>
-            </a:r>
-            <a:r>
-              <a:rPr lang="en-US" sz="3200" b="1" baseline="30000" dirty="0">
-                <a:latin typeface="Times"/>
-                <a:cs typeface="Times"/>
-              </a:rPr>
-              <a:t>pot to become hot</a:t>
-            </a:r>
-            <a:r>
-              <a:rPr lang="en-US" sz="3200" b="1" baseline="30000" dirty="0" smtClean="0">
-                <a:latin typeface="Times"/>
-                <a:cs typeface="Times"/>
-              </a:rPr>
-              <a:t>?</a:t>
-            </a:r>
-            <a:endParaRPr lang="en-US" sz="3200" baseline="30000" dirty="0">
-              <a:latin typeface="Times"/>
-              <a:cs typeface="Times"/>
-            </a:endParaRPr>
-          </a:p>
-          <a:p>
-            <a:pPr algn="just"/>
-            <a:endParaRPr lang="en-US" sz="3200" baseline="30000" dirty="0" smtClean="0">
-              <a:latin typeface="Times"/>
-              <a:cs typeface="Times"/>
-            </a:endParaRPr>
-          </a:p>
-          <a:p>
-            <a:pPr algn="just"/>
-            <a:r>
-              <a:rPr lang="en-US" sz="3200" baseline="30000" dirty="0" smtClean="0">
-                <a:latin typeface="Times"/>
-                <a:cs typeface="Times"/>
-              </a:rPr>
-              <a:t>(A) conduction </a:t>
-            </a:r>
-            <a:r>
-              <a:rPr lang="en-US" sz="3200" baseline="30000" dirty="0">
-                <a:latin typeface="Times"/>
-                <a:cs typeface="Times"/>
-              </a:rPr>
-              <a:t>(B) </a:t>
-            </a:r>
-            <a:r>
-              <a:rPr lang="en-US" sz="3200" baseline="30000" dirty="0" smtClean="0">
-                <a:latin typeface="Times"/>
-                <a:cs typeface="Times"/>
-              </a:rPr>
-              <a:t>convection </a:t>
-            </a:r>
-            <a:r>
-              <a:rPr lang="en-US" sz="3200" baseline="30000" dirty="0">
-                <a:latin typeface="Times"/>
-                <a:cs typeface="Times"/>
-              </a:rPr>
-              <a:t>(C) </a:t>
-            </a:r>
-            <a:r>
-              <a:rPr lang="en-US" sz="3200" baseline="30000" dirty="0" smtClean="0">
-                <a:latin typeface="Times"/>
-                <a:cs typeface="Times"/>
-              </a:rPr>
-              <a:t>radiation </a:t>
-            </a:r>
-            <a:r>
-              <a:rPr lang="en-US" sz="3200" baseline="30000" dirty="0">
-                <a:latin typeface="Times"/>
-                <a:cs typeface="Times"/>
-              </a:rPr>
-              <a:t>(D) </a:t>
-            </a:r>
-            <a:r>
-              <a:rPr lang="en-US" sz="3200" baseline="30000" dirty="0" smtClean="0">
-                <a:latin typeface="Times"/>
-                <a:cs typeface="Times"/>
-              </a:rPr>
-              <a:t>combustion.</a:t>
-            </a:r>
-          </a:p>
-        </p:txBody>
-      </p:sp>
+              </a:endParaRPr>
+            </a:p>
+            <a:p>
+              <a:pPr algn="just"/>
+              <a:r>
+                <a:rPr lang="en-US" sz="3200" baseline="30000" dirty="0" smtClean="0">
+                  <a:cs typeface="Times"/>
+                </a:rPr>
+                <a:t>(A) conduction </a:t>
+              </a:r>
+              <a:r>
+                <a:rPr lang="en-US" sz="3200" baseline="30000" dirty="0">
+                  <a:cs typeface="Times"/>
+                </a:rPr>
+                <a:t>(B) </a:t>
+              </a:r>
+              <a:r>
+                <a:rPr lang="en-US" sz="3200" baseline="30000" dirty="0" smtClean="0">
+                  <a:cs typeface="Times"/>
+                </a:rPr>
+                <a:t>convection </a:t>
+              </a:r>
+              <a:r>
+                <a:rPr lang="en-US" sz="3200" baseline="30000" dirty="0">
+                  <a:cs typeface="Times"/>
+                </a:rPr>
+                <a:t>(C) </a:t>
+              </a:r>
+              <a:r>
+                <a:rPr lang="en-US" sz="3200" baseline="30000" dirty="0" smtClean="0">
+                  <a:cs typeface="Times"/>
+                </a:rPr>
+                <a:t>radiation </a:t>
+              </a:r>
+              <a:r>
+                <a:rPr lang="en-US" sz="3200" baseline="30000" dirty="0">
+                  <a:cs typeface="Times"/>
+                </a:rPr>
+                <a:t>(D) </a:t>
+              </a:r>
+              <a:r>
+                <a:rPr lang="en-US" sz="3200" baseline="30000" dirty="0" smtClean="0">
+                  <a:cs typeface="Times"/>
+                </a:rPr>
+                <a:t>combustion.</a:t>
+              </a:r>
+            </a:p>
+          </p:txBody>
+        </p:sp>
+      </p:grpSp>
     </p:spTree>
     <p:extLst>
       <p:ext uri="{BB962C8B-B14F-4D97-AF65-F5344CB8AC3E}">
         <p14:creationId xmlns:p14="http://schemas.microsoft.com/office/powerpoint/2010/main" val="1563668749"/>
+      </p:ext>
+    </p:extLst>
+  </p:cSld>
+  <p:clrMapOvr>
+    <a:masterClrMapping/>
+  </p:clrMapOvr>
+</p:sld>
+</file>
+
+<file path=ppt/slides/slide6.xml><?xml version="1.0" encoding="utf-8"?>
+<p:sld xmlns:a="http://schemas.openxmlformats.org/drawingml/2006/main" xmlns:r="http://schemas.openxmlformats.org/officeDocument/2006/relationships" xmlns:p="http://schemas.openxmlformats.org/presentationml/2006/main">
+  <p:cSld>
+    <p:spTree>
+      <p:nvGrpSpPr>
+        <p:cNvPr id="1" name=""/>
+        <p:cNvGrpSpPr/>
+        <p:nvPr/>
+      </p:nvGrpSpPr>
+      <p:grpSpPr>
+        <a:xfrm>
+          <a:off x="0" y="0"/>
+          <a:ext cx="0" cy="0"/>
+          <a:chOff x="0" y="0"/>
+          <a:chExt cx="0" cy="0"/>
+        </a:xfrm>
+      </p:grpSpPr>
+      <p:graphicFrame>
+        <p:nvGraphicFramePr>
+          <p:cNvPr id="4" name="Table 3"/>
+          <p:cNvGraphicFramePr>
+            <a:graphicFrameLocks noGrp="1"/>
+          </p:cNvGraphicFramePr>
+          <p:nvPr>
+            <p:extLst>
+              <p:ext uri="{D42A27DB-BD31-4B8C-83A1-F6EECF244321}">
+                <p14:modId xmlns:p14="http://schemas.microsoft.com/office/powerpoint/2010/main" val="1876153058"/>
+              </p:ext>
+            </p:extLst>
+          </p:nvPr>
+        </p:nvGraphicFramePr>
+        <p:xfrm>
+          <a:off x="-1063626" y="79375"/>
+          <a:ext cx="12700000" cy="15216702"/>
+        </p:xfrm>
+        <a:graphic>
+          <a:graphicData uri="http://schemas.openxmlformats.org/drawingml/2006/table">
+            <a:tbl>
+              <a:tblPr firstRow="1" bandRow="1">
+                <a:tableStyleId>{00A15C55-8517-42AA-B614-E9B94910E393}</a:tableStyleId>
+              </a:tblPr>
+              <a:tblGrid>
+                <a:gridCol w="3175000"/>
+                <a:gridCol w="3175000"/>
+                <a:gridCol w="3175000"/>
+                <a:gridCol w="3175000"/>
+              </a:tblGrid>
+              <a:tr h="1238039">
+                <a:tc>
+                  <a:txBody>
+                    <a:bodyPr/>
+                    <a:lstStyle/>
+                    <a:p>
+                      <a:r>
+                        <a:rPr lang="en-US" sz="2800" u="sng" dirty="0" smtClean="0">
+                          <a:solidFill>
+                            <a:schemeClr val="tx1"/>
+                          </a:solidFill>
+                        </a:rPr>
+                        <a:t>Role</a:t>
+                      </a:r>
+                      <a:endParaRPr lang="en-US" sz="2800" b="1" u="sng" dirty="0">
+                        <a:solidFill>
+                          <a:schemeClr val="tx1"/>
+                        </a:solidFill>
+                      </a:endParaRPr>
+                    </a:p>
+                  </a:txBody>
+                  <a:tcPr anchor="ctr"/>
+                </a:tc>
+                <a:tc>
+                  <a:txBody>
+                    <a:bodyPr/>
+                    <a:lstStyle/>
+                    <a:p>
+                      <a:r>
+                        <a:rPr lang="en-US" sz="2800" u="sng" baseline="0" dirty="0" smtClean="0">
+                          <a:solidFill>
+                            <a:schemeClr val="tx1"/>
+                          </a:solidFill>
+                        </a:rPr>
+                        <a:t>Types</a:t>
+                      </a:r>
+                      <a:endParaRPr lang="en-US" sz="2800" b="1" u="sng" dirty="0">
+                        <a:solidFill>
+                          <a:schemeClr val="tx1"/>
+                        </a:solidFill>
+                      </a:endParaRPr>
+                    </a:p>
+                  </a:txBody>
+                  <a:tcPr anchor="ctr"/>
+                </a:tc>
+                <a:tc>
+                  <a:txBody>
+                    <a:bodyPr/>
+                    <a:lstStyle/>
+                    <a:p>
+                      <a:r>
+                        <a:rPr lang="en-US" sz="2800" u="sng" dirty="0" smtClean="0">
+                          <a:solidFill>
+                            <a:schemeClr val="tx1"/>
+                          </a:solidFill>
+                        </a:rPr>
+                        <a:t>Instances</a:t>
+                      </a:r>
+                      <a:endParaRPr lang="en-US" sz="2800" b="1" u="sng" dirty="0">
+                        <a:solidFill>
+                          <a:schemeClr val="tx1"/>
+                        </a:solidFill>
+                      </a:endParaRPr>
+                    </a:p>
+                  </a:txBody>
+                  <a:tcPr anchor="ctr"/>
+                </a:tc>
+                <a:tc>
+                  <a:txBody>
+                    <a:bodyPr/>
+                    <a:lstStyle/>
+                    <a:p>
+                      <a:r>
+                        <a:rPr lang="en-US" sz="2800" u="sng" dirty="0" smtClean="0">
+                          <a:solidFill>
+                            <a:schemeClr val="tx1"/>
+                          </a:solidFill>
+                        </a:rPr>
+                        <a:t>Patterns</a:t>
+                      </a:r>
+                      <a:endParaRPr lang="en-US" sz="2800" b="1" u="sng" dirty="0">
+                        <a:solidFill>
+                          <a:schemeClr val="tx1"/>
+                        </a:solidFill>
+                      </a:endParaRPr>
+                    </a:p>
+                  </a:txBody>
+                  <a:tcPr anchor="ctr"/>
+                </a:tc>
+              </a:tr>
+              <a:tr h="2202578">
+                <a:tc>
+                  <a:txBody>
+                    <a:bodyPr/>
+                    <a:lstStyle/>
+                    <a:p>
+                      <a:r>
+                        <a:rPr lang="en-US" sz="2800" dirty="0" smtClean="0"/>
+                        <a:t>Undergoer</a:t>
+                      </a:r>
+                      <a:endParaRPr lang="en-US" sz="2800" b="0" dirty="0"/>
+                    </a:p>
+                  </a:txBody>
+                  <a:tcPr anchor="ctr"/>
+                </a:tc>
+                <a:tc>
+                  <a:txBody>
+                    <a:bodyPr/>
+                    <a:lstStyle/>
+                    <a:p>
+                      <a:r>
+                        <a:rPr lang="en-US" sz="2800" dirty="0" smtClean="0"/>
+                        <a:t>Physical</a:t>
+                      </a:r>
+                      <a:r>
+                        <a:rPr lang="en-US" sz="2800" baseline="0" dirty="0" smtClean="0"/>
+                        <a:t> Object</a:t>
+                      </a:r>
+                      <a:endParaRPr lang="en-US" sz="2800" dirty="0"/>
+                    </a:p>
+                  </a:txBody>
+                  <a:tcPr anchor="ctr"/>
+                </a:tc>
+                <a:tc>
+                  <a:txBody>
+                    <a:bodyPr/>
+                    <a:lstStyle/>
+                    <a:p>
+                      <a:r>
+                        <a:rPr lang="en-US" sz="2800" dirty="0" smtClean="0"/>
+                        <a:t>Solid</a:t>
+                      </a:r>
+                      <a:r>
+                        <a:rPr lang="en-US" sz="2800" baseline="0" dirty="0" smtClean="0"/>
+                        <a:t>, pot, …</a:t>
+                      </a:r>
+                      <a:endParaRPr lang="en-US" sz="2800" dirty="0"/>
+                    </a:p>
+                  </a:txBody>
+                  <a:tcPr anchor="ctr"/>
+                </a:tc>
+                <a:tc>
+                  <a:txBody>
+                    <a:bodyPr/>
+                    <a:lstStyle/>
+                    <a:p>
+                      <a:r>
+                        <a:rPr lang="en-US" sz="2800" dirty="0" smtClean="0"/>
+                        <a:t>when</a:t>
+                      </a:r>
+                      <a:r>
+                        <a:rPr lang="en-US" sz="2800" baseline="0" dirty="0" smtClean="0"/>
+                        <a:t> &lt;x&gt; is heated, </a:t>
+                      </a:r>
+                    </a:p>
+                    <a:p>
+                      <a:r>
+                        <a:rPr lang="en-US" sz="2800" baseline="0" dirty="0" smtClean="0"/>
+                        <a:t>&lt;x&gt; conducts heat</a:t>
+                      </a:r>
+                      <a:endParaRPr lang="en-US" sz="2800" dirty="0"/>
+                    </a:p>
+                  </a:txBody>
+                  <a:tcPr anchor="ctr"/>
+                </a:tc>
+              </a:tr>
+              <a:tr h="1780166">
+                <a:tc>
+                  <a:txBody>
+                    <a:bodyPr/>
+                    <a:lstStyle/>
+                    <a:p>
+                      <a:r>
+                        <a:rPr lang="en-US" sz="2800" dirty="0" smtClean="0"/>
+                        <a:t>Enabler/</a:t>
+                      </a:r>
+                    </a:p>
+                    <a:p>
+                      <a:r>
+                        <a:rPr lang="en-US" sz="2800" dirty="0" smtClean="0"/>
+                        <a:t>Enabling Event</a:t>
+                      </a:r>
+                      <a:endParaRPr lang="en-US" sz="2800" dirty="0"/>
+                    </a:p>
+                  </a:txBody>
+                  <a:tcPr anchor="ctr"/>
+                </a:tc>
+                <a:tc>
+                  <a:txBody>
+                    <a:bodyPr/>
+                    <a:lstStyle/>
+                    <a:p>
+                      <a:r>
+                        <a:rPr lang="en-US" sz="2800" dirty="0" smtClean="0"/>
+                        <a:t>Physical</a:t>
+                      </a:r>
+                      <a:r>
+                        <a:rPr lang="en-US" sz="2800" baseline="0" dirty="0" smtClean="0"/>
+                        <a:t> Object</a:t>
+                      </a:r>
+                      <a:endParaRPr lang="en-US" sz="2800" dirty="0"/>
+                    </a:p>
+                  </a:txBody>
+                  <a:tcPr anchor="ctr"/>
+                </a:tc>
+                <a:tc>
+                  <a:txBody>
+                    <a:bodyPr/>
+                    <a:lstStyle/>
+                    <a:p>
+                      <a:r>
+                        <a:rPr lang="en-US" sz="2800" baseline="0" dirty="0" smtClean="0"/>
+                        <a:t>stove, flame, …</a:t>
+                      </a:r>
+                      <a:endParaRPr lang="en-US" sz="2800" dirty="0"/>
+                    </a:p>
+                  </a:txBody>
+                  <a:tcPr anchor="ctr"/>
+                </a:tc>
+                <a:tc>
+                  <a:txBody>
+                    <a:bodyPr/>
+                    <a:lstStyle/>
+                    <a:p>
+                      <a:r>
+                        <a:rPr lang="en-US" sz="2800" dirty="0" smtClean="0"/>
+                        <a:t>heated</a:t>
+                      </a:r>
+                      <a:r>
+                        <a:rPr lang="en-US" sz="2800" baseline="0" dirty="0" smtClean="0"/>
+                        <a:t> on the &lt;x&gt;,</a:t>
+                      </a:r>
+                    </a:p>
+                    <a:p>
+                      <a:r>
+                        <a:rPr lang="en-US" sz="2800" dirty="0" smtClean="0"/>
+                        <a:t>heated by  &lt;x&gt;</a:t>
+                      </a:r>
+                      <a:endParaRPr lang="en-US" sz="2800" dirty="0"/>
+                    </a:p>
+                  </a:txBody>
+                  <a:tcPr anchor="ctr"/>
+                </a:tc>
+              </a:tr>
+              <a:tr h="1780166">
+                <a:tc>
+                  <a:txBody>
+                    <a:bodyPr/>
+                    <a:lstStyle/>
+                    <a:p>
+                      <a:r>
+                        <a:rPr lang="en-US" sz="2800" dirty="0" smtClean="0"/>
+                        <a:t>Theme</a:t>
+                      </a:r>
+                      <a:endParaRPr lang="en-US" sz="2800" dirty="0"/>
+                    </a:p>
+                  </a:txBody>
+                  <a:tcPr anchor="ctr"/>
+                </a:tc>
+                <a:tc>
+                  <a:txBody>
+                    <a:bodyPr/>
+                    <a:lstStyle/>
+                    <a:p>
+                      <a:r>
+                        <a:rPr lang="en-US" sz="2800" dirty="0" smtClean="0"/>
+                        <a:t>Energy</a:t>
+                      </a:r>
+                      <a:endParaRPr lang="en-US" sz="2800" dirty="0"/>
+                    </a:p>
+                  </a:txBody>
+                  <a:tcPr anchor="ctr"/>
+                </a:tc>
+                <a:tc>
+                  <a:txBody>
+                    <a:bodyPr/>
+                    <a:lstStyle/>
+                    <a:p>
+                      <a:r>
+                        <a:rPr lang="en-US" sz="2800" dirty="0" smtClean="0"/>
+                        <a:t>heat,</a:t>
+                      </a:r>
+                      <a:r>
+                        <a:rPr lang="en-US" sz="2800" baseline="0" dirty="0" smtClean="0"/>
+                        <a:t> radiation, …</a:t>
+                      </a:r>
+                      <a:endParaRPr lang="en-US" sz="2800" dirty="0"/>
+                    </a:p>
+                  </a:txBody>
+                  <a:tcPr anchor="ctr"/>
+                </a:tc>
+                <a:tc>
+                  <a:txBody>
+                    <a:bodyPr/>
+                    <a:lstStyle/>
+                    <a:p>
+                      <a:r>
+                        <a:rPr lang="en-US" sz="2800" dirty="0" smtClean="0"/>
+                        <a:t>conducts &lt;x&gt;</a:t>
+                      </a:r>
+                    </a:p>
+                    <a:p>
+                      <a:r>
+                        <a:rPr lang="en-US" sz="2800" dirty="0" smtClean="0"/>
+                        <a:t>transfers</a:t>
+                      </a:r>
+                      <a:r>
+                        <a:rPr lang="en-US" sz="2800" baseline="0" dirty="0" smtClean="0"/>
+                        <a:t> &lt;x&gt;</a:t>
+                      </a:r>
+                      <a:endParaRPr lang="en-US" sz="2800" dirty="0" smtClean="0"/>
+                    </a:p>
+                  </a:txBody>
+                  <a:tcPr anchor="ctr"/>
+                </a:tc>
+              </a:tr>
+              <a:tr h="717277">
+                <a:tc>
+                  <a:txBody>
+                    <a:bodyPr/>
+                    <a:lstStyle/>
+                    <a:p>
+                      <a:r>
+                        <a:rPr lang="en-US" sz="2800" dirty="0" smtClean="0"/>
+                        <a:t>Output</a:t>
+                      </a:r>
+                      <a:endParaRPr lang="en-US" sz="2800" dirty="0"/>
+                    </a:p>
+                  </a:txBody>
+                  <a:tcPr anchor="ctr"/>
+                </a:tc>
+                <a:tc>
+                  <a:txBody>
+                    <a:bodyPr/>
+                    <a:lstStyle/>
+                    <a:p>
+                      <a:endParaRPr lang="en-US" sz="2800" dirty="0" smtClean="0"/>
+                    </a:p>
+                    <a:p>
+                      <a:r>
+                        <a:rPr lang="en-US" sz="2800" dirty="0" smtClean="0"/>
+                        <a:t>-</a:t>
+                      </a:r>
+                    </a:p>
+                    <a:p>
+                      <a:endParaRPr lang="en-US" sz="2800" dirty="0" smtClean="0"/>
+                    </a:p>
+                  </a:txBody>
+                  <a:tcPr anchor="ctr"/>
+                </a:tc>
+                <a:tc>
+                  <a:txBody>
+                    <a:bodyPr/>
+                    <a:lstStyle/>
+                    <a:p>
+                      <a:r>
+                        <a:rPr lang="en-US" sz="2800" dirty="0" smtClean="0"/>
+                        <a:t>-</a:t>
+                      </a:r>
+                      <a:endParaRPr lang="en-US" sz="2800" dirty="0"/>
+                    </a:p>
+                  </a:txBody>
+                  <a:tcPr anchor="ctr"/>
+                </a:tc>
+                <a:tc>
+                  <a:txBody>
+                    <a:bodyPr/>
+                    <a:lstStyle/>
+                    <a:p>
+                      <a:r>
+                        <a:rPr lang="en-US" sz="2800" dirty="0" smtClean="0"/>
+                        <a:t>-</a:t>
+                      </a:r>
+                      <a:endParaRPr lang="en-US" sz="2800" dirty="0"/>
+                    </a:p>
+                  </a:txBody>
+                  <a:tcPr anchor="ctr"/>
+                </a:tc>
+              </a:tr>
+              <a:tr h="935341">
+                <a:tc>
+                  <a:txBody>
+                    <a:bodyPr/>
+                    <a:lstStyle/>
+                    <a:p>
+                      <a:r>
+                        <a:rPr lang="en-US" sz="2800" dirty="0" smtClean="0"/>
+                        <a:t>Purpose/Consequence</a:t>
+                      </a:r>
+                      <a:endParaRPr lang="en-US" sz="2800" dirty="0"/>
+                    </a:p>
+                  </a:txBody>
+                  <a:tcPr anchor="ctr"/>
+                </a:tc>
+                <a:tc>
+                  <a:txBody>
+                    <a:bodyPr/>
+                    <a:lstStyle/>
+                    <a:p>
+                      <a:endParaRPr lang="en-US" sz="2800" dirty="0" smtClean="0"/>
+                    </a:p>
+                    <a:p>
+                      <a:r>
+                        <a:rPr lang="en-US" sz="2800" dirty="0" smtClean="0"/>
+                        <a:t>-</a:t>
+                      </a:r>
+                    </a:p>
+                    <a:p>
+                      <a:endParaRPr lang="en-US" sz="2800" dirty="0"/>
+                    </a:p>
+                  </a:txBody>
+                  <a:tcPr anchor="ctr"/>
+                </a:tc>
+                <a:tc>
+                  <a:txBody>
+                    <a:bodyPr/>
+                    <a:lstStyle/>
+                    <a:p>
+                      <a:r>
+                        <a:rPr lang="en-US" sz="2800" dirty="0" smtClean="0"/>
+                        <a:t>maintain</a:t>
+                      </a:r>
+                      <a:r>
+                        <a:rPr lang="en-US" sz="2800" baseline="0" dirty="0" smtClean="0"/>
+                        <a:t> appropriate temperature,</a:t>
+                      </a:r>
+                    </a:p>
+                    <a:p>
+                      <a:r>
+                        <a:rPr lang="en-US" sz="2800" baseline="0" dirty="0" err="1" smtClean="0"/>
+                        <a:t>radiative</a:t>
+                      </a:r>
+                      <a:r>
+                        <a:rPr lang="en-US" sz="2800" baseline="0" dirty="0" smtClean="0"/>
+                        <a:t> stability</a:t>
+                      </a:r>
+                      <a:endParaRPr lang="en-US" sz="2800" dirty="0"/>
+                    </a:p>
+                  </a:txBody>
+                  <a:tcPr anchor="ctr"/>
+                </a:tc>
+                <a:tc>
+                  <a:txBody>
+                    <a:bodyPr/>
+                    <a:lstStyle/>
+                    <a:p>
+                      <a:r>
+                        <a:rPr lang="en-US" sz="2800" dirty="0" smtClean="0"/>
+                        <a:t>Helps</a:t>
+                      </a:r>
+                      <a:r>
+                        <a:rPr lang="en-US" sz="2800" baseline="0" dirty="0" smtClean="0"/>
+                        <a:t> to &lt;x&gt;</a:t>
+                      </a:r>
+                      <a:endParaRPr lang="en-US" sz="2800" dirty="0"/>
+                    </a:p>
+                  </a:txBody>
+                  <a:tcPr anchor="ctr"/>
+                </a:tc>
+              </a:tr>
+              <a:tr h="717277">
+                <a:tc>
+                  <a:txBody>
+                    <a:bodyPr/>
+                    <a:lstStyle/>
+                    <a:p>
+                      <a:endParaRPr lang="en-US" sz="2800" dirty="0" smtClean="0"/>
+                    </a:p>
+                    <a:p>
+                      <a:r>
+                        <a:rPr lang="en-US" sz="2800" dirty="0" err="1" smtClean="0"/>
+                        <a:t>Benefactive</a:t>
+                      </a:r>
+                      <a:endParaRPr lang="en-US" sz="2800" dirty="0" smtClean="0"/>
+                    </a:p>
+                    <a:p>
+                      <a:endParaRPr lang="en-US" sz="2800" dirty="0"/>
+                    </a:p>
+                  </a:txBody>
+                  <a:tcPr anchor="ctr"/>
+                </a:tc>
+                <a:tc>
+                  <a:txBody>
+                    <a:bodyPr/>
+                    <a:lstStyle/>
+                    <a:p>
+                      <a:r>
+                        <a:rPr lang="en-US" sz="2800" dirty="0" smtClean="0"/>
+                        <a:t>-</a:t>
+                      </a:r>
+                      <a:endParaRPr lang="en-US" sz="2800" dirty="0"/>
+                    </a:p>
+                  </a:txBody>
+                  <a:tcPr anchor="ctr"/>
+                </a:tc>
+                <a:tc>
+                  <a:txBody>
+                    <a:bodyPr/>
+                    <a:lstStyle/>
+                    <a:p>
+                      <a:r>
+                        <a:rPr lang="en-US" sz="2800" dirty="0" smtClean="0"/>
+                        <a:t>-</a:t>
+                      </a:r>
+                      <a:endParaRPr lang="en-US" sz="2800" dirty="0"/>
+                    </a:p>
+                  </a:txBody>
+                  <a:tcPr anchor="ctr"/>
+                </a:tc>
+                <a:tc>
+                  <a:txBody>
+                    <a:bodyPr/>
+                    <a:lstStyle/>
+                    <a:p>
+                      <a:r>
+                        <a:rPr lang="en-US" sz="2800" smtClean="0"/>
+                        <a:t>-</a:t>
+                      </a:r>
+                      <a:endParaRPr lang="en-US" sz="2800" dirty="0" smtClean="0"/>
+                    </a:p>
+                  </a:txBody>
+                  <a:tcPr anchor="ctr"/>
+                </a:tc>
+              </a:tr>
+              <a:tr h="717277">
+                <a:tc>
+                  <a:txBody>
+                    <a:bodyPr/>
+                    <a:lstStyle/>
+                    <a:p>
+                      <a:r>
+                        <a:rPr lang="en-US" sz="2800" dirty="0" smtClean="0"/>
+                        <a:t>Source</a:t>
+                      </a:r>
+                      <a:endParaRPr lang="en-US" sz="2800" dirty="0"/>
+                    </a:p>
+                  </a:txBody>
+                  <a:tcPr anchor="ctr"/>
+                </a:tc>
+                <a:tc>
+                  <a:txBody>
+                    <a:bodyPr/>
+                    <a:lstStyle/>
+                    <a:p>
+                      <a:endParaRPr lang="en-US" sz="2800" dirty="0" smtClean="0"/>
+                    </a:p>
+                    <a:p>
+                      <a:r>
+                        <a:rPr lang="en-US" sz="2800" dirty="0" smtClean="0"/>
+                        <a:t>Physical Object</a:t>
+                      </a:r>
+                    </a:p>
+                    <a:p>
+                      <a:endParaRPr lang="en-US" sz="2800" dirty="0"/>
+                    </a:p>
+                  </a:txBody>
+                  <a:tcPr anchor="ctr"/>
+                </a:tc>
+                <a:tc>
+                  <a:txBody>
+                    <a:bodyPr/>
+                    <a:lstStyle/>
+                    <a:p>
+                      <a:r>
+                        <a:rPr lang="en-US" sz="2800" dirty="0" smtClean="0"/>
+                        <a:t>Solid, pot, …</a:t>
+                      </a:r>
+                      <a:endParaRPr lang="en-US" sz="2800" dirty="0"/>
+                    </a:p>
+                  </a:txBody>
+                  <a:tcPr anchor="ctr"/>
+                </a:tc>
+                <a:tc>
+                  <a:txBody>
+                    <a:bodyPr/>
+                    <a:lstStyle/>
+                    <a:p>
+                      <a:r>
+                        <a:rPr lang="en-US" sz="2800" dirty="0" smtClean="0"/>
+                        <a:t>when</a:t>
+                      </a:r>
+                      <a:r>
+                        <a:rPr lang="en-US" sz="2800" baseline="0" dirty="0" smtClean="0"/>
+                        <a:t> &lt;x&gt; is heated,</a:t>
+                      </a:r>
+                    </a:p>
+                    <a:p>
+                      <a:r>
+                        <a:rPr lang="en-US" sz="2800" baseline="0" dirty="0" smtClean="0"/>
+                        <a:t>&lt;x&gt; conducts heat</a:t>
+                      </a:r>
+                      <a:endParaRPr lang="en-US" sz="2800" dirty="0" smtClean="0"/>
+                    </a:p>
+                  </a:txBody>
+                  <a:tcPr anchor="ctr"/>
+                </a:tc>
+              </a:tr>
+              <a:tr h="717277">
+                <a:tc>
+                  <a:txBody>
+                    <a:bodyPr/>
+                    <a:lstStyle/>
+                    <a:p>
+                      <a:r>
+                        <a:rPr lang="en-US" sz="2800" dirty="0" smtClean="0"/>
+                        <a:t>Target</a:t>
+                      </a:r>
+                      <a:endParaRPr lang="en-US" sz="2800" dirty="0"/>
+                    </a:p>
+                  </a:txBody>
+                  <a:tcPr anchor="ctr"/>
+                </a:tc>
+                <a:tc>
+                  <a:txBody>
+                    <a:bodyPr/>
+                    <a:lstStyle/>
+                    <a:p>
+                      <a:endParaRPr lang="en-US" sz="2800" dirty="0" smtClean="0"/>
+                    </a:p>
+                    <a:p>
+                      <a:r>
+                        <a:rPr lang="en-US" sz="2800" dirty="0" smtClean="0"/>
+                        <a:t>Physical</a:t>
+                      </a:r>
+                      <a:r>
+                        <a:rPr lang="en-US" sz="2800" baseline="0" dirty="0" smtClean="0"/>
+                        <a:t> Object</a:t>
+                      </a:r>
+                      <a:endParaRPr lang="en-US" sz="2800" dirty="0" smtClean="0"/>
+                    </a:p>
+                    <a:p>
+                      <a:endParaRPr lang="en-US" sz="2800" dirty="0"/>
+                    </a:p>
+                  </a:txBody>
+                  <a:tcPr anchor="ctr"/>
+                </a:tc>
+                <a:tc>
+                  <a:txBody>
+                    <a:bodyPr/>
+                    <a:lstStyle/>
+                    <a:p>
+                      <a:r>
+                        <a:rPr lang="en-US" sz="2800" dirty="0" smtClean="0"/>
+                        <a:t>Handle, vessel</a:t>
+                      </a:r>
+                      <a:endParaRPr lang="en-US" sz="2800" dirty="0"/>
+                    </a:p>
+                  </a:txBody>
+                  <a:tcPr anchor="ctr"/>
+                </a:tc>
+                <a:tc>
+                  <a:txBody>
+                    <a:bodyPr/>
+                    <a:lstStyle/>
+                    <a:p>
+                      <a:r>
+                        <a:rPr lang="en-US" sz="2800" dirty="0" smtClean="0"/>
+                        <a:t>becomes</a:t>
+                      </a:r>
+                      <a:r>
+                        <a:rPr lang="en-US" sz="2800" baseline="0" dirty="0" smtClean="0"/>
+                        <a:t> &lt;x&gt; hot</a:t>
+                      </a:r>
+                      <a:endParaRPr lang="en-US" sz="2800" dirty="0" smtClean="0"/>
+                    </a:p>
+                  </a:txBody>
+                  <a:tcPr anchor="ctr"/>
+                </a:tc>
+              </a:tr>
+              <a:tr h="1357754">
+                <a:tc>
+                  <a:txBody>
+                    <a:bodyPr/>
+                    <a:lstStyle/>
+                    <a:p>
+                      <a:r>
+                        <a:rPr lang="en-US" sz="2800" dirty="0" smtClean="0"/>
+                        <a:t>Medium</a:t>
+                      </a:r>
+                      <a:endParaRPr lang="en-US" sz="2800" dirty="0"/>
+                    </a:p>
+                  </a:txBody>
+                  <a:tcPr anchor="ctr"/>
+                </a:tc>
+                <a:tc>
+                  <a:txBody>
+                    <a:bodyPr/>
+                    <a:lstStyle/>
+                    <a:p>
+                      <a:r>
+                        <a:rPr lang="en-US" sz="2800" dirty="0" smtClean="0"/>
+                        <a:t>solid</a:t>
+                      </a:r>
+                      <a:r>
+                        <a:rPr lang="en-US" sz="2800" baseline="0" dirty="0" smtClean="0"/>
+                        <a:t>, contact</a:t>
+                      </a:r>
+                      <a:endParaRPr lang="en-US" sz="2800" dirty="0"/>
+                    </a:p>
+                  </a:txBody>
+                  <a:tcPr anchor="ctr"/>
+                </a:tc>
+                <a:tc>
+                  <a:txBody>
+                    <a:bodyPr/>
+                    <a:lstStyle/>
+                    <a:p>
+                      <a:r>
+                        <a:rPr lang="en-US" sz="2800" dirty="0" smtClean="0"/>
+                        <a:t>Solid, contact,</a:t>
+                      </a:r>
+                      <a:r>
+                        <a:rPr lang="en-US" sz="2800" baseline="0" dirty="0" smtClean="0"/>
+                        <a:t> </a:t>
+                      </a:r>
+                    </a:p>
+                    <a:p>
+                      <a:r>
+                        <a:rPr lang="en-US" sz="2800" baseline="0" dirty="0" smtClean="0"/>
+                        <a:t>direct contact</a:t>
+                      </a:r>
+                      <a:endParaRPr lang="en-US" sz="2800" dirty="0"/>
+                    </a:p>
+                  </a:txBody>
+                  <a:tcPr anchor="ctr"/>
+                </a:tc>
+                <a:tc>
+                  <a:txBody>
+                    <a:bodyPr/>
+                    <a:lstStyle/>
+                    <a:p>
+                      <a:r>
+                        <a:rPr lang="en-US" sz="2800" dirty="0" smtClean="0"/>
+                        <a:t>via</a:t>
+                      </a:r>
+                      <a:r>
+                        <a:rPr lang="en-US" sz="2800" baseline="0" dirty="0" smtClean="0"/>
+                        <a:t> &lt;x&gt;, </a:t>
+                      </a:r>
+                    </a:p>
+                    <a:p>
+                      <a:r>
+                        <a:rPr lang="en-US" sz="2800" baseline="0" dirty="0" smtClean="0"/>
+                        <a:t>in touch with &lt;x&gt;</a:t>
+                      </a:r>
+                      <a:endParaRPr lang="en-US" sz="2800" dirty="0" smtClean="0"/>
+                    </a:p>
+                  </a:txBody>
+                  <a:tcPr anchor="ctr"/>
+                </a:tc>
+              </a:tr>
+            </a:tbl>
+          </a:graphicData>
+        </a:graphic>
+      </p:graphicFrame>
+    </p:spTree>
+    <p:extLst>
+      <p:ext uri="{BB962C8B-B14F-4D97-AF65-F5344CB8AC3E}">
+        <p14:creationId xmlns:p14="http://schemas.microsoft.com/office/powerpoint/2010/main" val="2391856810"/>
       </p:ext>
     </p:extLst>
   </p:cSld>

</xml_diff>

<commit_message>
Figure changes. Intro changes
</commit_message>
<xml_diff>
--- a/tex/figures/architecture.pptx
+++ b/tex/figures/architecture.pptx
@@ -8,7 +8,7 @@
     <p:sldMasterId id="2147483720" r:id="rId4"/>
   </p:sldMasterIdLst>
   <p:notesMasterIdLst>
-    <p:notesMasterId r:id="rId11"/>
+    <p:notesMasterId r:id="rId12"/>
   </p:notesMasterIdLst>
   <p:sldIdLst>
     <p:sldId id="256" r:id="rId5"/>
@@ -16,7 +16,8 @@
     <p:sldId id="258" r:id="rId7"/>
     <p:sldId id="261" r:id="rId8"/>
     <p:sldId id="259" r:id="rId9"/>
-    <p:sldId id="260" r:id="rId10"/>
+    <p:sldId id="262" r:id="rId10"/>
+    <p:sldId id="260" r:id="rId11"/>
   </p:sldIdLst>
   <p:sldSz cx="9144000" cy="6858000" type="screen4x3"/>
   <p:notesSz cx="6858000" cy="9144000"/>
@@ -618,6 +619,90 @@
             <a:fld id="{8C136986-AA16-8C47-9C0A-BEB54C93F616}" type="slidenum">
               <a:rPr lang="en-US" smtClean="0"/>
               <a:t>5</a:t>
+            </a:fld>
+            <a:endParaRPr lang="en-US"/>
+          </a:p>
+        </p:txBody>
+      </p:sp>
+    </p:spTree>
+    <p:extLst>
+      <p:ext uri="{BB962C8B-B14F-4D97-AF65-F5344CB8AC3E}">
+        <p14:creationId xmlns:p14="http://schemas.microsoft.com/office/powerpoint/2010/main" val="2469276172"/>
+      </p:ext>
+    </p:extLst>
+  </p:cSld>
+  <p:clrMapOvr>
+    <a:masterClrMapping/>
+  </p:clrMapOvr>
+</p:notes>
+</file>
+
+<file path=ppt/notesSlides/notesSlide3.xml><?xml version="1.0" encoding="utf-8"?>
+<p:notes xmlns:a="http://schemas.openxmlformats.org/drawingml/2006/main" xmlns:r="http://schemas.openxmlformats.org/officeDocument/2006/relationships" xmlns:p="http://schemas.openxmlformats.org/presentationml/2006/main">
+  <p:cSld>
+    <p:spTree>
+      <p:nvGrpSpPr>
+        <p:cNvPr id="1" name=""/>
+        <p:cNvGrpSpPr/>
+        <p:nvPr/>
+      </p:nvGrpSpPr>
+      <p:grpSpPr>
+        <a:xfrm>
+          <a:off x="0" y="0"/>
+          <a:ext cx="0" cy="0"/>
+          <a:chOff x="0" y="0"/>
+          <a:chExt cx="0" cy="0"/>
+        </a:xfrm>
+      </p:grpSpPr>
+      <p:sp>
+        <p:nvSpPr>
+          <p:cNvPr id="2" name="Slide Image Placeholder 1"/>
+          <p:cNvSpPr>
+            <a:spLocks noGrp="1" noRot="1" noChangeAspect="1"/>
+          </p:cNvSpPr>
+          <p:nvPr>
+            <p:ph type="sldImg"/>
+          </p:nvPr>
+        </p:nvSpPr>
+        <p:spPr/>
+      </p:sp>
+      <p:sp>
+        <p:nvSpPr>
+          <p:cNvPr id="3" name="Notes Placeholder 2"/>
+          <p:cNvSpPr>
+            <a:spLocks noGrp="1"/>
+          </p:cNvSpPr>
+          <p:nvPr>
+            <p:ph type="body" idx="1"/>
+          </p:nvPr>
+        </p:nvSpPr>
+        <p:spPr/>
+        <p:txBody>
+          <a:bodyPr/>
+          <a:lstStyle/>
+          <a:p>
+            <a:endParaRPr lang="en-US" dirty="0"/>
+          </a:p>
+        </p:txBody>
+      </p:sp>
+      <p:sp>
+        <p:nvSpPr>
+          <p:cNvPr id="4" name="Slide Number Placeholder 3"/>
+          <p:cNvSpPr>
+            <a:spLocks noGrp="1"/>
+          </p:cNvSpPr>
+          <p:nvPr>
+            <p:ph type="sldNum" sz="quarter" idx="10"/>
+          </p:nvPr>
+        </p:nvSpPr>
+        <p:spPr/>
+        <p:txBody>
+          <a:bodyPr/>
+          <a:lstStyle/>
+          <a:p>
+            <a:fld id="{8C136986-AA16-8C47-9C0A-BEB54C93F616}" type="slidenum">
+              <a:rPr lang="en-US" smtClean="0"/>
+              <a:t>6</a:t>
             </a:fld>
             <a:endParaRPr lang="en-US"/>
           </a:p>
@@ -15589,6 +15674,242 @@
           <a:chExt cx="0" cy="0"/>
         </a:xfrm>
       </p:grpSpPr>
+      <p:grpSp>
+        <p:nvGrpSpPr>
+          <p:cNvPr id="7" name="Group 6"/>
+          <p:cNvGrpSpPr/>
+          <p:nvPr/>
+        </p:nvGrpSpPr>
+        <p:grpSpPr>
+          <a:xfrm>
+            <a:off x="-514228" y="1273264"/>
+            <a:ext cx="10937875" cy="1631861"/>
+            <a:chOff x="317499" y="1381126"/>
+            <a:chExt cx="8175625" cy="3844457"/>
+          </a:xfrm>
+        </p:grpSpPr>
+        <p:sp>
+          <p:nvSpPr>
+            <p:cNvPr id="6" name="Rounded Rectangle 5"/>
+            <p:cNvSpPr/>
+            <p:nvPr/>
+          </p:nvSpPr>
+          <p:spPr>
+            <a:xfrm>
+              <a:off x="317499" y="1381126"/>
+              <a:ext cx="8175625" cy="3844457"/>
+            </a:xfrm>
+            <a:prstGeom prst="roundRect">
+              <a:avLst/>
+            </a:prstGeom>
+            <a:noFill/>
+            <a:ln w="101600" cmpd="dbl"/>
+          </p:spPr>
+          <p:style>
+            <a:lnRef idx="1">
+              <a:schemeClr val="accent4"/>
+            </a:lnRef>
+            <a:fillRef idx="2">
+              <a:schemeClr val="accent4"/>
+            </a:fillRef>
+            <a:effectRef idx="1">
+              <a:schemeClr val="accent4"/>
+            </a:effectRef>
+            <a:fontRef idx="minor">
+              <a:schemeClr val="dk1"/>
+            </a:fontRef>
+          </p:style>
+          <p:txBody>
+            <a:bodyPr rtlCol="0" anchor="ctr"/>
+            <a:lstStyle/>
+            <a:p>
+              <a:pPr algn="ctr"/>
+              <a:endParaRPr lang="en-US"/>
+            </a:p>
+          </p:txBody>
+        </p:sp>
+        <p:sp>
+          <p:nvSpPr>
+            <p:cNvPr id="4" name="Rectangle 3"/>
+            <p:cNvSpPr/>
+            <p:nvPr/>
+          </p:nvSpPr>
+          <p:spPr>
+            <a:xfrm>
+              <a:off x="701864" y="2180150"/>
+              <a:ext cx="7651749" cy="1972879"/>
+            </a:xfrm>
+            <a:prstGeom prst="rect">
+              <a:avLst/>
+            </a:prstGeom>
+            <a:noFill/>
+            <a:ln w="76200" cmpd="tri">
+              <a:noFill/>
+            </a:ln>
+          </p:spPr>
+          <p:style>
+            <a:lnRef idx="1">
+              <a:schemeClr val="accent4"/>
+            </a:lnRef>
+            <a:fillRef idx="2">
+              <a:schemeClr val="accent4"/>
+            </a:fillRef>
+            <a:effectRef idx="1">
+              <a:schemeClr val="accent4"/>
+            </a:effectRef>
+            <a:fontRef idx="minor">
+              <a:schemeClr val="dk1"/>
+            </a:fontRef>
+          </p:style>
+          <p:txBody>
+            <a:bodyPr wrap="square">
+              <a:spAutoFit/>
+            </a:bodyPr>
+            <a:lstStyle/>
+            <a:p>
+              <a:pPr algn="just"/>
+              <a:r>
+                <a:rPr lang="en-US" sz="3200" b="1" baseline="30000" dirty="0" smtClean="0">
+                  <a:cs typeface="Times"/>
+                </a:rPr>
+                <a:t> A </a:t>
+              </a:r>
+              <a:r>
+                <a:rPr lang="en-US" sz="3200" b="1" baseline="30000" dirty="0">
+                  <a:cs typeface="Times"/>
+                </a:rPr>
+                <a:t>pot is heated on a stove. </a:t>
+              </a:r>
+              <a:r>
+                <a:rPr lang="en-US" sz="3200" b="1" baseline="30000" dirty="0" smtClean="0">
+                  <a:cs typeface="Times"/>
+                </a:rPr>
+                <a:t>What </a:t>
+              </a:r>
+              <a:r>
+                <a:rPr lang="en-US" sz="3200" b="1" baseline="30000" dirty="0">
+                  <a:cs typeface="Times"/>
+                </a:rPr>
+                <a:t>causes the metal handle </a:t>
+              </a:r>
+              <a:r>
+                <a:rPr lang="en-US" sz="3200" b="1" baseline="30000" dirty="0" smtClean="0">
+                  <a:cs typeface="Times"/>
+                </a:rPr>
+                <a:t>of</a:t>
+              </a:r>
+              <a:r>
+                <a:rPr lang="en-US" sz="3200" b="1" dirty="0" smtClean="0">
+                  <a:cs typeface="Times"/>
+                </a:rPr>
+                <a:t> </a:t>
+              </a:r>
+              <a:r>
+                <a:rPr lang="en-US" sz="3200" b="1" baseline="30000" dirty="0" smtClean="0">
+                  <a:cs typeface="Times"/>
+                </a:rPr>
+                <a:t>the </a:t>
+              </a:r>
+              <a:r>
+                <a:rPr lang="en-US" sz="3200" b="1" baseline="30000" dirty="0">
+                  <a:cs typeface="Times"/>
+                </a:rPr>
+                <a:t>pot to become hot</a:t>
+              </a:r>
+              <a:r>
+                <a:rPr lang="en-US" sz="3200" b="1" baseline="30000" dirty="0" smtClean="0">
+                  <a:cs typeface="Times"/>
+                </a:rPr>
+                <a:t>?</a:t>
+              </a:r>
+              <a:endParaRPr lang="en-US" sz="3200" baseline="30000" dirty="0" smtClean="0">
+                <a:cs typeface="Times"/>
+              </a:endParaRPr>
+            </a:p>
+            <a:p>
+              <a:pPr algn="just"/>
+              <a:r>
+                <a:rPr lang="en-US" sz="3200" baseline="30000" dirty="0" smtClean="0">
+                  <a:cs typeface="Times"/>
+                </a:rPr>
+                <a:t>(A) conduction </a:t>
+              </a:r>
+              <a:r>
+                <a:rPr lang="en-US" sz="3200" baseline="30000" dirty="0">
+                  <a:cs typeface="Times"/>
+                </a:rPr>
+                <a:t>(B) </a:t>
+              </a:r>
+              <a:r>
+                <a:rPr lang="en-US" sz="3200" baseline="30000" dirty="0" smtClean="0">
+                  <a:cs typeface="Times"/>
+                </a:rPr>
+                <a:t>convection </a:t>
+              </a:r>
+              <a:r>
+                <a:rPr lang="en-US" sz="3200" baseline="30000" dirty="0">
+                  <a:cs typeface="Times"/>
+                </a:rPr>
+                <a:t>(C) </a:t>
+              </a:r>
+              <a:r>
+                <a:rPr lang="en-US" sz="3200" baseline="30000" dirty="0" smtClean="0">
+                  <a:cs typeface="Times"/>
+                </a:rPr>
+                <a:t>radiation </a:t>
+              </a:r>
+              <a:r>
+                <a:rPr lang="en-US" sz="3200" baseline="30000" dirty="0">
+                  <a:cs typeface="Times"/>
+                </a:rPr>
+                <a:t>(D) </a:t>
+              </a:r>
+              <a:r>
+                <a:rPr lang="en-US" sz="3200" baseline="30000" dirty="0" smtClean="0">
+                  <a:cs typeface="Times"/>
+                </a:rPr>
+                <a:t>combustion.</a:t>
+              </a:r>
+            </a:p>
+            <a:p>
+              <a:pPr algn="just"/>
+              <a:endParaRPr lang="en-US" sz="3200" baseline="30000" dirty="0" smtClean="0">
+                <a:cs typeface="Times"/>
+              </a:endParaRPr>
+            </a:p>
+          </p:txBody>
+        </p:sp>
+      </p:grpSp>
+    </p:spTree>
+    <p:extLst>
+      <p:ext uri="{BB962C8B-B14F-4D97-AF65-F5344CB8AC3E}">
+        <p14:creationId xmlns:p14="http://schemas.microsoft.com/office/powerpoint/2010/main" val="3779355597"/>
+      </p:ext>
+    </p:extLst>
+  </p:cSld>
+  <p:clrMapOvr>
+    <a:masterClrMapping/>
+  </p:clrMapOvr>
+</p:sld>
+</file>
+
+<file path=ppt/slides/slide7.xml><?xml version="1.0" encoding="utf-8"?>
+<p:sld xmlns:a="http://schemas.openxmlformats.org/drawingml/2006/main" xmlns:r="http://schemas.openxmlformats.org/officeDocument/2006/relationships" xmlns:p="http://schemas.openxmlformats.org/presentationml/2006/main">
+  <p:cSld>
+    <p:spTree>
+      <p:nvGrpSpPr>
+        <p:cNvPr id="1" name=""/>
+        <p:cNvGrpSpPr/>
+        <p:nvPr/>
+      </p:nvGrpSpPr>
+      <p:grpSpPr>
+        <a:xfrm>
+          <a:off x="0" y="0"/>
+          <a:ext cx="0" cy="0"/>
+          <a:chOff x="0" y="0"/>
+          <a:chExt cx="0" cy="0"/>
+        </a:xfrm>
+      </p:grpSpPr>
       <p:graphicFrame>
         <p:nvGraphicFramePr>
           <p:cNvPr id="4" name="Table 3"/>
@@ -15598,14 +15919,14 @@
           <p:nvPr>
             <p:extLst>
               <p:ext uri="{D42A27DB-BD31-4B8C-83A1-F6EECF244321}">
-                <p14:modId xmlns:p14="http://schemas.microsoft.com/office/powerpoint/2010/main" val="1876153058"/>
+                <p14:modId xmlns:p14="http://schemas.microsoft.com/office/powerpoint/2010/main" val="2630079921"/>
               </p:ext>
             </p:extLst>
           </p:nvPr>
         </p:nvGraphicFramePr>
         <p:xfrm>
-          <a:off x="-1063626" y="79375"/>
-          <a:ext cx="12700000" cy="15216702"/>
+          <a:off x="-3143250" y="79375"/>
+          <a:ext cx="17176750" cy="6193186"/>
         </p:xfrm>
         <a:graphic>
           <a:graphicData uri="http://schemas.openxmlformats.org/drawingml/2006/table">
@@ -15614,12 +15935,12 @@
                 <a:tableStyleId>{00A15C55-8517-42AA-B614-E9B94910E393}</a:tableStyleId>
               </a:tblPr>
               <a:tblGrid>
-                <a:gridCol w="3175000"/>
-                <a:gridCol w="3175000"/>
-                <a:gridCol w="3175000"/>
-                <a:gridCol w="3175000"/>
+                <a:gridCol w="4202685"/>
+                <a:gridCol w="2803244"/>
+                <a:gridCol w="3648305"/>
+                <a:gridCol w="6522516"/>
               </a:tblGrid>
-              <a:tr h="1238039">
+              <a:tr h="557561">
                 <a:tc>
                   <a:txBody>
                     <a:bodyPr/>
@@ -15709,7 +16030,7 @@
                   <a:tcPr anchor="ctr"/>
                 </a:tc>
               </a:tr>
-              <a:tr h="2202578">
+              <a:tr h="557561">
                 <a:tc>
                   <a:txBody>
                     <a:bodyPr/>
@@ -15722,7 +16043,7 @@
                       <a:endParaRPr lang="en-US" sz="2800" b="0" dirty="0"/>
                     </a:p>
                   </a:txBody>
-                  <a:tcPr anchor="ctr"/>
+                  <a:tcPr marL="45720" marR="45720"/>
                 </a:tc>
                 <a:tc>
                   <a:txBody>
@@ -15740,7 +16061,7 @@
                       <a:endParaRPr lang="en-US" sz="2800" dirty="0"/>
                     </a:p>
                   </a:txBody>
-                  <a:tcPr anchor="ctr"/>
+                  <a:tcPr marL="45720" marR="45720"/>
                 </a:tc>
                 <a:tc>
                   <a:txBody>
@@ -15749,7 +16070,7 @@
                     <a:p>
                       <a:r>
                         <a:rPr lang="en-US" sz="2800" dirty="0" smtClean="0"/>
-                        <a:t>Solid</a:t>
+                        <a:t>solid</a:t>
                       </a:r>
                       <a:r>
                         <a:rPr lang="en-US" sz="2800" baseline="0" dirty="0" smtClean="0"/>
@@ -15758,7 +16079,7 @@
                       <a:endParaRPr lang="en-US" sz="2800" dirty="0"/>
                     </a:p>
                   </a:txBody>
-                  <a:tcPr anchor="ctr"/>
+                  <a:tcPr marL="45720" marR="45720"/>
                 </a:tc>
                 <a:tc>
                   <a:txBody>
@@ -15771,21 +16092,15 @@
                       </a:r>
                       <a:r>
                         <a:rPr lang="en-US" sz="2800" baseline="0" dirty="0" smtClean="0"/>
-                        <a:t> &lt;x&gt; is heated, </a:t>
-                      </a:r>
-                    </a:p>
-                    <a:p>
-                      <a:r>
-                        <a:rPr lang="en-US" sz="2800" baseline="0" dirty="0" smtClean="0"/>
-                        <a:t>&lt;x&gt; conducts heat</a:t>
+                        <a:t> &lt;x&gt; is heated,  &lt;x&gt; conducts heat, …</a:t>
                       </a:r>
                       <a:endParaRPr lang="en-US" sz="2800" dirty="0"/>
                     </a:p>
                   </a:txBody>
-                  <a:tcPr anchor="ctr"/>
+                  <a:tcPr marL="45720" marR="45720"/>
                 </a:tc>
               </a:tr>
-              <a:tr h="1780166">
+              <a:tr h="557561">
                 <a:tc>
                   <a:txBody>
                     <a:bodyPr/>
@@ -15793,18 +16108,12 @@
                     <a:p>
                       <a:r>
                         <a:rPr lang="en-US" sz="2800" dirty="0" smtClean="0"/>
-                        <a:t>Enabler/</a:t>
-                      </a:r>
-                    </a:p>
-                    <a:p>
-                      <a:r>
-                        <a:rPr lang="en-US" sz="2800" dirty="0" smtClean="0"/>
-                        <a:t>Enabling Event</a:t>
+                        <a:t>Enabler/Enabling Event</a:t>
                       </a:r>
                       <a:endParaRPr lang="en-US" sz="2800" dirty="0"/>
                     </a:p>
                   </a:txBody>
-                  <a:tcPr anchor="ctr"/>
+                  <a:tcPr marL="45720" marR="45720"/>
                 </a:tc>
                 <a:tc>
                   <a:txBody>
@@ -15822,7 +16131,7 @@
                       <a:endParaRPr lang="en-US" sz="2800" dirty="0"/>
                     </a:p>
                   </a:txBody>
-                  <a:tcPr anchor="ctr"/>
+                  <a:tcPr marL="45720" marR="45720"/>
                 </a:tc>
                 <a:tc>
                   <a:txBody>
@@ -15836,7 +16145,7 @@
                       <a:endParaRPr lang="en-US" sz="2800" dirty="0"/>
                     </a:p>
                   </a:txBody>
-                  <a:tcPr anchor="ctr"/>
+                  <a:tcPr marL="45720" marR="45720"/>
                 </a:tc>
                 <a:tc>
                   <a:txBody>
@@ -15849,21 +16158,19 @@
                       </a:r>
                       <a:r>
                         <a:rPr lang="en-US" sz="2800" baseline="0" dirty="0" smtClean="0"/>
-                        <a:t> on the &lt;x&gt;,</a:t>
+                        <a:t> on the &lt;x&gt;, </a:t>
                       </a:r>
-                    </a:p>
-                    <a:p>
                       <a:r>
                         <a:rPr lang="en-US" sz="2800" dirty="0" smtClean="0"/>
-                        <a:t>heated by  &lt;x&gt;</a:t>
+                        <a:t>heated by  &lt;x&gt;, …</a:t>
                       </a:r>
                       <a:endParaRPr lang="en-US" sz="2800" dirty="0"/>
                     </a:p>
                   </a:txBody>
-                  <a:tcPr anchor="ctr"/>
+                  <a:tcPr marL="45720" marR="45720"/>
                 </a:tc>
               </a:tr>
-              <a:tr h="1780166">
+              <a:tr h="557561">
                 <a:tc>
                   <a:txBody>
                     <a:bodyPr/>
@@ -15876,7 +16183,7 @@
                       <a:endParaRPr lang="en-US" sz="2800" dirty="0"/>
                     </a:p>
                   </a:txBody>
-                  <a:tcPr anchor="ctr"/>
+                  <a:tcPr marL="45720" marR="45720"/>
                 </a:tc>
                 <a:tc>
                   <a:txBody>
@@ -15890,7 +16197,7 @@
                       <a:endParaRPr lang="en-US" sz="2800" dirty="0"/>
                     </a:p>
                   </a:txBody>
-                  <a:tcPr anchor="ctr"/>
+                  <a:tcPr marL="45720" marR="45720"/>
                 </a:tc>
                 <a:tc>
                   <a:txBody>
@@ -15908,7 +16215,7 @@
                       <a:endParaRPr lang="en-US" sz="2800" dirty="0"/>
                     </a:p>
                   </a:txBody>
-                  <a:tcPr anchor="ctr"/>
+                  <a:tcPr marL="45720" marR="45720"/>
                 </a:tc>
                 <a:tc>
                   <a:txBody>
@@ -15917,25 +16224,27 @@
                     <a:p>
                       <a:r>
                         <a:rPr lang="en-US" sz="2800" dirty="0" smtClean="0"/>
-                        <a:t>conducts &lt;x&gt;</a:t>
+                        <a:t>conducts &lt;x&gt;,</a:t>
                       </a:r>
-                    </a:p>
-                    <a:p>
+                      <a:r>
+                        <a:rPr lang="en-US" sz="2800" baseline="0" dirty="0" smtClean="0"/>
+                        <a:t> </a:t>
+                      </a:r>
                       <a:r>
                         <a:rPr lang="en-US" sz="2800" dirty="0" smtClean="0"/>
                         <a:t>transfers</a:t>
                       </a:r>
                       <a:r>
                         <a:rPr lang="en-US" sz="2800" baseline="0" dirty="0" smtClean="0"/>
-                        <a:t> &lt;x&gt;</a:t>
+                        <a:t> &lt;x&gt;, …</a:t>
                       </a:r>
                       <a:endParaRPr lang="en-US" sz="2800" dirty="0" smtClean="0"/>
                     </a:p>
                   </a:txBody>
-                  <a:tcPr anchor="ctr"/>
+                  <a:tcPr marL="45720" marR="45720"/>
                 </a:tc>
               </a:tr>
-              <a:tr h="717277">
+              <a:tr h="557561">
                 <a:tc>
                   <a:txBody>
                     <a:bodyPr/>
@@ -15948,26 +16257,20 @@
                       <a:endParaRPr lang="en-US" sz="2800" dirty="0"/>
                     </a:p>
                   </a:txBody>
-                  <a:tcPr anchor="ctr"/>
+                  <a:tcPr marL="45720" marR="45720"/>
                 </a:tc>
                 <a:tc>
                   <a:txBody>
                     <a:bodyPr/>
                     <a:lstStyle/>
                     <a:p>
-                      <a:endParaRPr lang="en-US" sz="2800" dirty="0" smtClean="0"/>
-                    </a:p>
-                    <a:p>
                       <a:r>
                         <a:rPr lang="en-US" sz="2800" dirty="0" smtClean="0"/>
                         <a:t>-</a:t>
                       </a:r>
                     </a:p>
-                    <a:p>
-                      <a:endParaRPr lang="en-US" sz="2800" dirty="0" smtClean="0"/>
-                    </a:p>
                   </a:txBody>
-                  <a:tcPr anchor="ctr"/>
+                  <a:tcPr marL="45720" marR="45720"/>
                 </a:tc>
                 <a:tc>
                   <a:txBody>
@@ -15981,7 +16284,7 @@
                       <a:endParaRPr lang="en-US" sz="2800" dirty="0"/>
                     </a:p>
                   </a:txBody>
-                  <a:tcPr anchor="ctr"/>
+                  <a:tcPr marL="45720" marR="45720"/>
                 </a:tc>
                 <a:tc>
                   <a:txBody>
@@ -15995,10 +16298,10 @@
                       <a:endParaRPr lang="en-US" sz="2800" dirty="0"/>
                     </a:p>
                   </a:txBody>
-                  <a:tcPr anchor="ctr"/>
+                  <a:tcPr marL="45720" marR="45720"/>
                 </a:tc>
               </a:tr>
-              <a:tr h="935341">
+              <a:tr h="720570">
                 <a:tc>
                   <a:txBody>
                     <a:bodyPr/>
@@ -16011,26 +16314,20 @@
                       <a:endParaRPr lang="en-US" sz="2800" dirty="0"/>
                     </a:p>
                   </a:txBody>
-                  <a:tcPr anchor="ctr"/>
+                  <a:tcPr marL="45720" marR="45720"/>
                 </a:tc>
                 <a:tc>
                   <a:txBody>
                     <a:bodyPr/>
                     <a:lstStyle/>
                     <a:p>
-                      <a:endParaRPr lang="en-US" sz="2800" dirty="0" smtClean="0"/>
-                    </a:p>
-                    <a:p>
                       <a:r>
                         <a:rPr lang="en-US" sz="2800" dirty="0" smtClean="0"/>
                         <a:t>-</a:t>
                       </a:r>
                     </a:p>
-                    <a:p>
-                      <a:endParaRPr lang="en-US" sz="2800" dirty="0"/>
-                    </a:p>
                   </a:txBody>
-                  <a:tcPr anchor="ctr"/>
+                  <a:tcPr marL="45720" marR="45720"/>
                 </a:tc>
                 <a:tc>
                   <a:txBody>
@@ -16043,22 +16340,12 @@
                       </a:r>
                       <a:r>
                         <a:rPr lang="en-US" sz="2800" baseline="0" dirty="0" smtClean="0"/>
-                        <a:t> appropriate temperature,</a:t>
-                      </a:r>
-                    </a:p>
-                    <a:p>
-                      <a:r>
-                        <a:rPr lang="en-US" sz="2800" baseline="0" dirty="0" err="1" smtClean="0"/>
-                        <a:t>radiative</a:t>
-                      </a:r>
-                      <a:r>
-                        <a:rPr lang="en-US" sz="2800" baseline="0" dirty="0" smtClean="0"/>
-                        <a:t> stability</a:t>
+                        <a:t> temperature, …</a:t>
                       </a:r>
                       <a:endParaRPr lang="en-US" sz="2800" dirty="0"/>
                     </a:p>
                   </a:txBody>
-                  <a:tcPr anchor="ctr"/>
+                  <a:tcPr marL="45720" marR="45720"/>
                 </a:tc>
                 <a:tc>
                   <a:txBody>
@@ -16067,26 +16354,23 @@
                     <a:p>
                       <a:r>
                         <a:rPr lang="en-US" sz="2800" dirty="0" smtClean="0"/>
-                        <a:t>Helps</a:t>
+                        <a:t>helps</a:t>
                       </a:r>
                       <a:r>
                         <a:rPr lang="en-US" sz="2800" baseline="0" dirty="0" smtClean="0"/>
-                        <a:t> to &lt;x&gt;</a:t>
+                        <a:t> to &lt;x&gt;, …</a:t>
                       </a:r>
                       <a:endParaRPr lang="en-US" sz="2800" dirty="0"/>
                     </a:p>
                   </a:txBody>
-                  <a:tcPr anchor="ctr"/>
+                  <a:tcPr marL="45720" marR="45720"/>
                 </a:tc>
               </a:tr>
-              <a:tr h="717277">
+              <a:tr h="714375">
                 <a:tc>
                   <a:txBody>
                     <a:bodyPr/>
                     <a:lstStyle/>
-                    <a:p>
-                      <a:endParaRPr lang="en-US" sz="2800" dirty="0" smtClean="0"/>
-                    </a:p>
                     <a:p>
                       <a:r>
                         <a:rPr lang="en-US" sz="2800" dirty="0" err="1" smtClean="0"/>
@@ -16094,11 +16378,8 @@
                       </a:r>
                       <a:endParaRPr lang="en-US" sz="2800" dirty="0" smtClean="0"/>
                     </a:p>
-                    <a:p>
-                      <a:endParaRPr lang="en-US" sz="2800" dirty="0"/>
-                    </a:p>
                   </a:txBody>
-                  <a:tcPr anchor="ctr"/>
+                  <a:tcPr marL="45720" marR="45720"/>
                 </a:tc>
                 <a:tc>
                   <a:txBody>
@@ -16112,7 +16393,7 @@
                       <a:endParaRPr lang="en-US" sz="2800" dirty="0"/>
                     </a:p>
                   </a:txBody>
-                  <a:tcPr anchor="ctr"/>
+                  <a:tcPr marL="45720" marR="45720"/>
                 </a:tc>
                 <a:tc>
                   <a:txBody>
@@ -16126,7 +16407,7 @@
                       <a:endParaRPr lang="en-US" sz="2800" dirty="0"/>
                     </a:p>
                   </a:txBody>
-                  <a:tcPr anchor="ctr"/>
+                  <a:tcPr marL="45720" marR="45720"/>
                 </a:tc>
                 <a:tc>
                   <a:txBody>
@@ -16134,16 +16415,15 @@
                     <a:lstStyle/>
                     <a:p>
                       <a:r>
-                        <a:rPr lang="en-US" sz="2800" smtClean="0"/>
+                        <a:rPr lang="en-US" sz="2800" dirty="0" smtClean="0"/>
                         <a:t>-</a:t>
                       </a:r>
-                      <a:endParaRPr lang="en-US" sz="2800" dirty="0" smtClean="0"/>
                     </a:p>
                   </a:txBody>
-                  <a:tcPr anchor="ctr"/>
+                  <a:tcPr marL="45720" marR="45720"/>
                 </a:tc>
               </a:tr>
-              <a:tr h="717277">
+              <a:tr h="730250">
                 <a:tc>
                   <a:txBody>
                     <a:bodyPr/>
@@ -16156,26 +16436,7 @@
                       <a:endParaRPr lang="en-US" sz="2800" dirty="0"/>
                     </a:p>
                   </a:txBody>
-                  <a:tcPr anchor="ctr"/>
-                </a:tc>
-                <a:tc>
-                  <a:txBody>
-                    <a:bodyPr/>
-                    <a:lstStyle/>
-                    <a:p>
-                      <a:endParaRPr lang="en-US" sz="2800" dirty="0" smtClean="0"/>
-                    </a:p>
-                    <a:p>
-                      <a:r>
-                        <a:rPr lang="en-US" sz="2800" dirty="0" smtClean="0"/>
-                        <a:t>Physical Object</a:t>
-                      </a:r>
-                    </a:p>
-                    <a:p>
-                      <a:endParaRPr lang="en-US" sz="2800" dirty="0"/>
-                    </a:p>
-                  </a:txBody>
-                  <a:tcPr anchor="ctr"/>
+                  <a:tcPr marL="45720" marR="45720"/>
                 </a:tc>
                 <a:tc>
                   <a:txBody>
@@ -16184,12 +16445,25 @@
                     <a:p>
                       <a:r>
                         <a:rPr lang="en-US" sz="2800" dirty="0" smtClean="0"/>
-                        <a:t>Solid, pot, …</a:t>
+                        <a:t>Physical Object</a:t>
+                      </a:r>
+                    </a:p>
+                  </a:txBody>
+                  <a:tcPr marL="45720" marR="45720"/>
+                </a:tc>
+                <a:tc>
+                  <a:txBody>
+                    <a:bodyPr/>
+                    <a:lstStyle/>
+                    <a:p>
+                      <a:r>
+                        <a:rPr lang="en-US" sz="2800" dirty="0" smtClean="0"/>
+                        <a:t>solid, pot, …</a:t>
                       </a:r>
                       <a:endParaRPr lang="en-US" sz="2800" dirty="0"/>
                     </a:p>
                   </a:txBody>
-                  <a:tcPr anchor="ctr"/>
+                  <a:tcPr marL="45720" marR="45720"/>
                 </a:tc>
                 <a:tc>
                   <a:txBody>
@@ -16202,21 +16476,15 @@
                       </a:r>
                       <a:r>
                         <a:rPr lang="en-US" sz="2800" baseline="0" dirty="0" smtClean="0"/>
-                        <a:t> &lt;x&gt; is heated,</a:t>
-                      </a:r>
-                    </a:p>
-                    <a:p>
-                      <a:r>
-                        <a:rPr lang="en-US" sz="2800" baseline="0" dirty="0" smtClean="0"/>
-                        <a:t>&lt;x&gt; conducts heat</a:t>
+                        <a:t> &lt;x&gt; is heated, &lt;x&gt; conducts heat, …</a:t>
                       </a:r>
                       <a:endParaRPr lang="en-US" sz="2800" dirty="0" smtClean="0"/>
                     </a:p>
                   </a:txBody>
-                  <a:tcPr anchor="ctr"/>
+                  <a:tcPr marL="45720" marR="45720"/>
                 </a:tc>
               </a:tr>
-              <a:tr h="717277">
+              <a:tr h="682625">
                 <a:tc>
                   <a:txBody>
                     <a:bodyPr/>
@@ -16229,15 +16497,12 @@
                       <a:endParaRPr lang="en-US" sz="2800" dirty="0"/>
                     </a:p>
                   </a:txBody>
-                  <a:tcPr anchor="ctr"/>
+                  <a:tcPr marL="45720" marR="45720"/>
                 </a:tc>
                 <a:tc>
                   <a:txBody>
                     <a:bodyPr/>
                     <a:lstStyle/>
-                    <a:p>
-                      <a:endParaRPr lang="en-US" sz="2800" dirty="0" smtClean="0"/>
-                    </a:p>
                     <a:p>
                       <a:r>
                         <a:rPr lang="en-US" sz="2800" dirty="0" smtClean="0"/>
@@ -16249,11 +16514,8 @@
                       </a:r>
                       <a:endParaRPr lang="en-US" sz="2800" dirty="0" smtClean="0"/>
                     </a:p>
-                    <a:p>
-                      <a:endParaRPr lang="en-US" sz="2800" dirty="0"/>
-                    </a:p>
                   </a:txBody>
-                  <a:tcPr anchor="ctr"/>
+                  <a:tcPr marL="45720" marR="45720"/>
                 </a:tc>
                 <a:tc>
                   <a:txBody>
@@ -16262,12 +16524,12 @@
                     <a:p>
                       <a:r>
                         <a:rPr lang="en-US" sz="2800" dirty="0" smtClean="0"/>
-                        <a:t>Handle, vessel</a:t>
+                        <a:t>handle, vessel, …</a:t>
                       </a:r>
                       <a:endParaRPr lang="en-US" sz="2800" dirty="0"/>
                     </a:p>
                   </a:txBody>
-                  <a:tcPr anchor="ctr"/>
+                  <a:tcPr marL="45720" marR="45720"/>
                 </a:tc>
                 <a:tc>
                   <a:txBody>
@@ -16280,15 +16542,15 @@
                       </a:r>
                       <a:r>
                         <a:rPr lang="en-US" sz="2800" baseline="0" dirty="0" smtClean="0"/>
-                        <a:t> &lt;x&gt; hot</a:t>
+                        <a:t> &lt;x&gt; hot, …</a:t>
                       </a:r>
                       <a:endParaRPr lang="en-US" sz="2800" dirty="0" smtClean="0"/>
                     </a:p>
                   </a:txBody>
-                  <a:tcPr anchor="ctr"/>
+                  <a:tcPr marL="45720" marR="45720"/>
                 </a:tc>
               </a:tr>
-              <a:tr h="1357754">
+              <a:tr h="557561">
                 <a:tc>
                   <a:txBody>
                     <a:bodyPr/>
@@ -16301,7 +16563,11 @@
                       <a:endParaRPr lang="en-US" sz="2800" dirty="0"/>
                     </a:p>
                   </a:txBody>
-                  <a:tcPr anchor="ctr"/>
+                  <a:tcPr marL="45720" marR="45720">
+                    <a:solidFill>
+                      <a:srgbClr val="FFFFFF"/>
+                    </a:solidFill>
+                  </a:tcPr>
                 </a:tc>
                 <a:tc>
                   <a:txBody>
@@ -16319,7 +16585,11 @@
                       <a:endParaRPr lang="en-US" sz="2800" dirty="0"/>
                     </a:p>
                   </a:txBody>
-                  <a:tcPr anchor="ctr"/>
+                  <a:tcPr marL="45720" marR="45720">
+                    <a:solidFill>
+                      <a:srgbClr val="FFFFFF"/>
+                    </a:solidFill>
+                  </a:tcPr>
                 </a:tc>
                 <a:tc>
                   <a:txBody>
@@ -16328,22 +16598,19 @@
                     <a:p>
                       <a:r>
                         <a:rPr lang="en-US" sz="2800" dirty="0" smtClean="0"/>
-                        <a:t>Solid, contact,</a:t>
+                        <a:t>solid, contact,</a:t>
                       </a:r>
                       <a:r>
                         <a:rPr lang="en-US" sz="2800" baseline="0" dirty="0" smtClean="0"/>
-                        <a:t> </a:t>
+                        <a:t> …</a:t>
                       </a:r>
                     </a:p>
-                    <a:p>
-                      <a:r>
-                        <a:rPr lang="en-US" sz="2800" baseline="0" dirty="0" smtClean="0"/>
-                        <a:t>direct contact</a:t>
-                      </a:r>
-                      <a:endParaRPr lang="en-US" sz="2800" dirty="0"/>
-                    </a:p>
                   </a:txBody>
-                  <a:tcPr anchor="ctr"/>
+                  <a:tcPr marL="45720" marR="45720">
+                    <a:solidFill>
+                      <a:srgbClr val="FFFFFF"/>
+                    </a:solidFill>
+                  </a:tcPr>
                 </a:tc>
                 <a:tc>
                   <a:txBody>
@@ -16356,18 +16623,20 @@
                       </a:r>
                       <a:r>
                         <a:rPr lang="en-US" sz="2800" baseline="0" dirty="0" smtClean="0"/>
-                        <a:t> &lt;x&gt;, </a:t>
+                        <a:t> &lt;x&gt;,  in touch with &lt;</a:t>
                       </a:r>
-                    </a:p>
-                    <a:p>
                       <a:r>
-                        <a:rPr lang="en-US" sz="2800" baseline="0" dirty="0" smtClean="0"/>
-                        <a:t>in touch with &lt;x&gt;</a:t>
+                        <a:rPr lang="en-US" sz="2800" baseline="0" smtClean="0"/>
+                        <a:t>x&gt;, …</a:t>
                       </a:r>
                       <a:endParaRPr lang="en-US" sz="2800" dirty="0" smtClean="0"/>
                     </a:p>
                   </a:txBody>
-                  <a:tcPr anchor="ctr"/>
+                  <a:tcPr marL="45720" marR="45720">
+                    <a:solidFill>
+                      <a:srgbClr val="FFFFFF"/>
+                    </a:solidFill>
+                  </a:tcPr>
                 </a:tc>
               </a:tr>
             </a:tbl>

</xml_diff>